<commit_message>
Updated robs position in the pres
</commit_message>
<xml_diff>
--- a/homeworks/Homework 1/Homework 1.pptx
+++ b/homeworks/Homework 1/Homework 1.pptx
@@ -125,7 +125,7 @@
 <file path=ppt/revisionInfo.xml><?xml version="1.0" encoding="utf-8"?>
 <p1510:revInfo xmlns:a="http://schemas.openxmlformats.org/drawingml/2006/main" xmlns:r="http://schemas.openxmlformats.org/officeDocument/2006/relationships" xmlns:p1510="http://schemas.microsoft.com/office/powerpoint/2015/10/main">
   <p1510:revLst>
-    <p1510:client id="{7FC9E883-C68B-4964-A306-A09B374A8666}" v="11" dt="2025-09-15T17:34:11.891"/>
+    <p1510:client id="{7FC9E883-C68B-4964-A306-A09B374A8666}" v="26" dt="2025-09-15T19:46:58.800"/>
   </p1510:revLst>
 </p1510:revInfo>
 </file>
@@ -894,7 +894,7 @@
   <pc:docChgLst>
     <pc:chgData name="Staley, Sean" userId="5b65b0e7-e88b-4844-a922-92ee8e1c9235" providerId="ADAL" clId="{7FC9E883-C68B-4964-A306-A09B374A8666}"/>
     <pc:docChg chg="custSel addSld modSld sldOrd">
-      <pc:chgData name="Staley, Sean" userId="5b65b0e7-e88b-4844-a922-92ee8e1c9235" providerId="ADAL" clId="{7FC9E883-C68B-4964-A306-A09B374A8666}" dt="2025-09-15T17:34:32.096" v="1568" actId="20577"/>
+      <pc:chgData name="Staley, Sean" userId="5b65b0e7-e88b-4844-a922-92ee8e1c9235" providerId="ADAL" clId="{7FC9E883-C68B-4964-A306-A09B374A8666}" dt="2025-09-15T19:46:58.800" v="1583" actId="20577"/>
       <pc:docMkLst>
         <pc:docMk/>
       </pc:docMkLst>
@@ -1048,13 +1048,13 @@
         </pc:spChg>
       </pc:sldChg>
       <pc:sldChg chg="modSp">
-        <pc:chgData name="Staley, Sean" userId="5b65b0e7-e88b-4844-a922-92ee8e1c9235" providerId="ADAL" clId="{7FC9E883-C68B-4964-A306-A09B374A8666}" dt="2025-09-15T17:34:11.891" v="1566" actId="20577"/>
+        <pc:chgData name="Staley, Sean" userId="5b65b0e7-e88b-4844-a922-92ee8e1c9235" providerId="ADAL" clId="{7FC9E883-C68B-4964-A306-A09B374A8666}" dt="2025-09-15T19:46:58.800" v="1583" actId="20577"/>
         <pc:sldMkLst>
           <pc:docMk/>
           <pc:sldMk cId="2470439829" sldId="269"/>
         </pc:sldMkLst>
         <pc:graphicFrameChg chg="mod">
-          <ac:chgData name="Staley, Sean" userId="5b65b0e7-e88b-4844-a922-92ee8e1c9235" providerId="ADAL" clId="{7FC9E883-C68B-4964-A306-A09B374A8666}" dt="2025-09-15T17:34:11.891" v="1566" actId="20577"/>
+          <ac:chgData name="Staley, Sean" userId="5b65b0e7-e88b-4844-a922-92ee8e1c9235" providerId="ADAL" clId="{7FC9E883-C68B-4964-A306-A09B374A8666}" dt="2025-09-15T19:46:58.800" v="1583" actId="20577"/>
           <ac:graphicFrameMkLst>
             <pc:docMk/>
             <pc:sldMk cId="2470439829" sldId="269"/>
@@ -5639,7 +5639,7 @@
         <a:p>
           <a:r>
             <a:rPr lang="en-US" baseline="0" dirty="0"/>
-            <a:t>Robert Wickliffe - TBD</a:t>
+            <a:t>Robert Wickliffe – Full Stack Dev</a:t>
           </a:r>
           <a:endParaRPr lang="en-US" dirty="0"/>
         </a:p>
@@ -8101,7 +8101,7 @@
           </a:pPr>
           <a:r>
             <a:rPr lang="en-US" sz="2000" kern="1200" baseline="0" dirty="0"/>
-            <a:t>Robert Wickliffe - TBD</a:t>
+            <a:t>Robert Wickliffe – Full Stack Dev</a:t>
           </a:r>
           <a:endParaRPr lang="en-US" sz="2000" kern="1200" dirty="0"/>
         </a:p>
@@ -17169,7 +17169,7 @@
             <p:ph idx="1"/>
             <p:extLst>
               <p:ext uri="{D42A27DB-BD31-4B8C-83A1-F6EECF244321}">
-                <p14:modId xmlns:p14="http://schemas.microsoft.com/office/powerpoint/2010/main" val="593620642"/>
+                <p14:modId xmlns:p14="http://schemas.microsoft.com/office/powerpoint/2010/main" val="2980228904"/>
               </p:ext>
             </p:extLst>
           </p:nvPr>

</xml_diff>

<commit_message>
Updating homework 1 files
</commit_message>
<xml_diff>
--- a/homeworks/Homework 1/Homework 1.pptx
+++ b/homeworks/Homework 1/Homework 1.pptx
@@ -125,6 +125,7 @@
 <file path=ppt/revisionInfo.xml><?xml version="1.0" encoding="utf-8"?>
 <p1510:revInfo xmlns:a="http://schemas.openxmlformats.org/drawingml/2006/main" xmlns:r="http://schemas.openxmlformats.org/officeDocument/2006/relationships" xmlns:p1510="http://schemas.microsoft.com/office/powerpoint/2015/10/main">
   <p1510:revLst>
+    <p1510:client id="{765B6454-1945-B9A9-DB4F-4D8891203318}" v="18" dt="2025-09-16T01:10:11.372"/>
     <p1510:client id="{7FC9E883-C68B-4964-A306-A09B374A8666}" v="26" dt="2025-09-15T19:46:58.800"/>
   </p1510:revLst>
 </p1510:revInfo>
@@ -132,6 +133,149 @@
 
 <file path=ppt/changesInfos/changesInfo1.xml><?xml version="1.0" encoding="utf-8"?>
 <pc:chgInfo xmlns:a="http://schemas.openxmlformats.org/drawingml/2006/main" xmlns:r="http://schemas.openxmlformats.org/officeDocument/2006/relationships" xmlns:ac="http://schemas.microsoft.com/office/drawing/2013/main/command" xmlns:pc="http://schemas.microsoft.com/office/powerpoint/2013/main/command">
+  <pc:docChgLst>
+    <pc:chgData name="Staley, Sean" userId="S::ststal01@louisville.edu::5b65b0e7-e88b-4844-a922-92ee8e1c9235" providerId="AD" clId="Web-{6E268690-6EDC-BB23-CFFA-DB7A7D5359F5}"/>
+    <pc:docChg chg="addSld delSld modSld sldOrd">
+      <pc:chgData name="Staley, Sean" userId="S::ststal01@louisville.edu::5b65b0e7-e88b-4844-a922-92ee8e1c9235" providerId="AD" clId="Web-{6E268690-6EDC-BB23-CFFA-DB7A7D5359F5}" dt="2025-09-12T04:04:38.232" v="281" actId="20577"/>
+      <pc:docMkLst>
+        <pc:docMk/>
+      </pc:docMkLst>
+      <pc:sldChg chg="modSp ord">
+        <pc:chgData name="Staley, Sean" userId="S::ststal01@louisville.edu::5b65b0e7-e88b-4844-a922-92ee8e1c9235" providerId="AD" clId="Web-{6E268690-6EDC-BB23-CFFA-DB7A7D5359F5}" dt="2025-09-12T03:54:08.747" v="8"/>
+        <pc:sldMkLst>
+          <pc:docMk/>
+          <pc:sldMk cId="2103210548" sldId="257"/>
+        </pc:sldMkLst>
+      </pc:sldChg>
+      <pc:sldChg chg="ord">
+        <pc:chgData name="Staley, Sean" userId="S::ststal01@louisville.edu::5b65b0e7-e88b-4844-a922-92ee8e1c9235" providerId="AD" clId="Web-{6E268690-6EDC-BB23-CFFA-DB7A7D5359F5}" dt="2025-09-12T03:54:10.934" v="9"/>
+        <pc:sldMkLst>
+          <pc:docMk/>
+          <pc:sldMk cId="651332071" sldId="258"/>
+        </pc:sldMkLst>
+      </pc:sldChg>
+      <pc:sldChg chg="modSp ord">
+        <pc:chgData name="Staley, Sean" userId="S::ststal01@louisville.edu::5b65b0e7-e88b-4844-a922-92ee8e1c9235" providerId="AD" clId="Web-{6E268690-6EDC-BB23-CFFA-DB7A7D5359F5}" dt="2025-09-12T03:53:58.200" v="7" actId="20577"/>
+        <pc:sldMkLst>
+          <pc:docMk/>
+          <pc:sldMk cId="1203497075" sldId="259"/>
+        </pc:sldMkLst>
+      </pc:sldChg>
+      <pc:sldChg chg="del">
+        <pc:chgData name="Staley, Sean" userId="S::ststal01@louisville.edu::5b65b0e7-e88b-4844-a922-92ee8e1c9235" providerId="AD" clId="Web-{6E268690-6EDC-BB23-CFFA-DB7A7D5359F5}" dt="2025-09-12T03:54:20.169" v="10"/>
+        <pc:sldMkLst>
+          <pc:docMk/>
+          <pc:sldMk cId="3109130739" sldId="260"/>
+        </pc:sldMkLst>
+      </pc:sldChg>
+      <pc:sldChg chg="modSp">
+        <pc:chgData name="Staley, Sean" userId="S::ststal01@louisville.edu::5b65b0e7-e88b-4844-a922-92ee8e1c9235" providerId="AD" clId="Web-{6E268690-6EDC-BB23-CFFA-DB7A7D5359F5}" dt="2025-09-12T03:59:06.153" v="104" actId="20577"/>
+        <pc:sldMkLst>
+          <pc:docMk/>
+          <pc:sldMk cId="2835959447" sldId="263"/>
+        </pc:sldMkLst>
+        <pc:spChg chg="mod">
+          <ac:chgData name="Staley, Sean" userId="S::ststal01@louisville.edu::5b65b0e7-e88b-4844-a922-92ee8e1c9235" providerId="AD" clId="Web-{6E268690-6EDC-BB23-CFFA-DB7A7D5359F5}" dt="2025-09-12T03:59:06.153" v="104" actId="20577"/>
+          <ac:spMkLst>
+            <pc:docMk/>
+            <pc:sldMk cId="2835959447" sldId="263"/>
+            <ac:spMk id="3" creationId="{FD21E7DD-17EB-7AAE-18F0-3811F164F20C}"/>
+          </ac:spMkLst>
+        </pc:spChg>
+      </pc:sldChg>
+      <pc:sldChg chg="modSp">
+        <pc:chgData name="Staley, Sean" userId="S::ststal01@louisville.edu::5b65b0e7-e88b-4844-a922-92ee8e1c9235" providerId="AD" clId="Web-{6E268690-6EDC-BB23-CFFA-DB7A7D5359F5}" dt="2025-09-12T03:55:33.919" v="24" actId="20577"/>
+        <pc:sldMkLst>
+          <pc:docMk/>
+          <pc:sldMk cId="3361632356" sldId="264"/>
+        </pc:sldMkLst>
+        <pc:spChg chg="mod">
+          <ac:chgData name="Staley, Sean" userId="S::ststal01@louisville.edu::5b65b0e7-e88b-4844-a922-92ee8e1c9235" providerId="AD" clId="Web-{6E268690-6EDC-BB23-CFFA-DB7A7D5359F5}" dt="2025-09-12T03:55:33.919" v="24" actId="20577"/>
+          <ac:spMkLst>
+            <pc:docMk/>
+            <pc:sldMk cId="3361632356" sldId="264"/>
+            <ac:spMk id="3" creationId="{3EB76FBE-AAE9-8202-E038-8C6A1184DF99}"/>
+          </ac:spMkLst>
+        </pc:spChg>
+      </pc:sldChg>
+      <pc:sldChg chg="modSp">
+        <pc:chgData name="Staley, Sean" userId="S::ststal01@louisville.edu::5b65b0e7-e88b-4844-a922-92ee8e1c9235" providerId="AD" clId="Web-{6E268690-6EDC-BB23-CFFA-DB7A7D5359F5}" dt="2025-09-12T03:58:41.700" v="102" actId="20577"/>
+        <pc:sldMkLst>
+          <pc:docMk/>
+          <pc:sldMk cId="1331313356" sldId="265"/>
+        </pc:sldMkLst>
+        <pc:spChg chg="mod">
+          <ac:chgData name="Staley, Sean" userId="S::ststal01@louisville.edu::5b65b0e7-e88b-4844-a922-92ee8e1c9235" providerId="AD" clId="Web-{6E268690-6EDC-BB23-CFFA-DB7A7D5359F5}" dt="2025-09-12T03:58:41.700" v="102" actId="20577"/>
+          <ac:spMkLst>
+            <pc:docMk/>
+            <pc:sldMk cId="1331313356" sldId="265"/>
+            <ac:spMk id="3" creationId="{50051190-FAC9-608A-B999-7887E434E599}"/>
+          </ac:spMkLst>
+        </pc:spChg>
+      </pc:sldChg>
+      <pc:sldChg chg="modSp">
+        <pc:chgData name="Staley, Sean" userId="S::ststal01@louisville.edu::5b65b0e7-e88b-4844-a922-92ee8e1c9235" providerId="AD" clId="Web-{6E268690-6EDC-BB23-CFFA-DB7A7D5359F5}" dt="2025-09-12T04:02:22.107" v="198" actId="20577"/>
+        <pc:sldMkLst>
+          <pc:docMk/>
+          <pc:sldMk cId="2626683754" sldId="266"/>
+        </pc:sldMkLst>
+        <pc:spChg chg="mod">
+          <ac:chgData name="Staley, Sean" userId="S::ststal01@louisville.edu::5b65b0e7-e88b-4844-a922-92ee8e1c9235" providerId="AD" clId="Web-{6E268690-6EDC-BB23-CFFA-DB7A7D5359F5}" dt="2025-09-12T04:02:22.107" v="198" actId="20577"/>
+          <ac:spMkLst>
+            <pc:docMk/>
+            <pc:sldMk cId="2626683754" sldId="266"/>
+            <ac:spMk id="3" creationId="{39660FE2-EB95-4EE1-FCD9-D7A320C01092}"/>
+          </ac:spMkLst>
+        </pc:spChg>
+      </pc:sldChg>
+      <pc:sldChg chg="modSp add replId">
+        <pc:chgData name="Staley, Sean" userId="S::ststal01@louisville.edu::5b65b0e7-e88b-4844-a922-92ee8e1c9235" providerId="AD" clId="Web-{6E268690-6EDC-BB23-CFFA-DB7A7D5359F5}" dt="2025-09-12T04:04:38.232" v="281" actId="20577"/>
+        <pc:sldMkLst>
+          <pc:docMk/>
+          <pc:sldMk cId="2910431911" sldId="267"/>
+        </pc:sldMkLst>
+        <pc:spChg chg="mod">
+          <ac:chgData name="Staley, Sean" userId="S::ststal01@louisville.edu::5b65b0e7-e88b-4844-a922-92ee8e1c9235" providerId="AD" clId="Web-{6E268690-6EDC-BB23-CFFA-DB7A7D5359F5}" dt="2025-09-12T04:04:38.232" v="281" actId="20577"/>
+          <ac:spMkLst>
+            <pc:docMk/>
+            <pc:sldMk cId="2910431911" sldId="267"/>
+            <ac:spMk id="3" creationId="{DFB20121-A57A-8A22-129F-2C0D0ACD4ADD}"/>
+          </ac:spMkLst>
+        </pc:spChg>
+      </pc:sldChg>
+      <pc:sldChg chg="new del">
+        <pc:chgData name="Staley, Sean" userId="S::ststal01@louisville.edu::5b65b0e7-e88b-4844-a922-92ee8e1c9235" providerId="AD" clId="Web-{6E268690-6EDC-BB23-CFFA-DB7A7D5359F5}" dt="2025-09-12T04:02:43.169" v="200"/>
+        <pc:sldMkLst>
+          <pc:docMk/>
+          <pc:sldMk cId="3723843586" sldId="267"/>
+        </pc:sldMkLst>
+      </pc:sldChg>
+    </pc:docChg>
+  </pc:docChgLst>
+  <pc:docChgLst>
+    <pc:chgData name="Wattley, Jaden" userId="S::jtwatt03@louisville.edu::473f42a4-82b8-4bb1-b33a-3982d1502758" providerId="AD" clId="Web-{AE1B7785-1AAA-6F66-193C-42FBE3AFD947}"/>
+    <pc:docChg chg="modSld">
+      <pc:chgData name="Wattley, Jaden" userId="S::jtwatt03@louisville.edu::473f42a4-82b8-4bb1-b33a-3982d1502758" providerId="AD" clId="Web-{AE1B7785-1AAA-6F66-193C-42FBE3AFD947}" dt="2025-09-16T12:33:57.688" v="0" actId="1076"/>
+      <pc:docMkLst>
+        <pc:docMk/>
+      </pc:docMkLst>
+      <pc:sldChg chg="modSp">
+        <pc:chgData name="Wattley, Jaden" userId="S::jtwatt03@louisville.edu::473f42a4-82b8-4bb1-b33a-3982d1502758" providerId="AD" clId="Web-{AE1B7785-1AAA-6F66-193C-42FBE3AFD947}" dt="2025-09-16T12:33:57.688" v="0" actId="1076"/>
+        <pc:sldMkLst>
+          <pc:docMk/>
+          <pc:sldMk cId="3752665594" sldId="261"/>
+        </pc:sldMkLst>
+        <pc:graphicFrameChg chg="mod">
+          <ac:chgData name="Wattley, Jaden" userId="S::jtwatt03@louisville.edu::473f42a4-82b8-4bb1-b33a-3982d1502758" providerId="AD" clId="Web-{AE1B7785-1AAA-6F66-193C-42FBE3AFD947}" dt="2025-09-16T12:33:57.688" v="0" actId="1076"/>
+          <ac:graphicFrameMkLst>
+            <pc:docMk/>
+            <pc:sldMk cId="3752665594" sldId="261"/>
+            <ac:graphicFrameMk id="5" creationId="{89EE04C2-4725-5169-C7F4-51E4EE5D9AB0}"/>
+          </ac:graphicFrameMkLst>
+        </pc:graphicFrameChg>
+      </pc:sldChg>
+    </pc:docChg>
+  </pc:docChgLst>
   <pc:docChgLst>
     <pc:chgData name="Staley, Sean" userId="S::ststal01@louisville.edu::5b65b0e7-e88b-4844-a922-92ee8e1c9235" providerId="AD" clId="Web-{B8EBD0BA-A7F4-EBE7-AEFD-E412CBF8902F}"/>
     <pc:docChg chg="addSld delSld modSld">
@@ -393,48 +537,109 @@
     </pc:docChg>
   </pc:docChgLst>
   <pc:docChgLst>
-    <pc:chgData name="Staley, Sean" userId="S::ststal01@louisville.edu::5b65b0e7-e88b-4844-a922-92ee8e1c9235" providerId="AD" clId="Web-{6E268690-6EDC-BB23-CFFA-DB7A7D5359F5}"/>
-    <pc:docChg chg="addSld delSld modSld sldOrd">
-      <pc:chgData name="Staley, Sean" userId="S::ststal01@louisville.edu::5b65b0e7-e88b-4844-a922-92ee8e1c9235" providerId="AD" clId="Web-{6E268690-6EDC-BB23-CFFA-DB7A7D5359F5}" dt="2025-09-12T04:04:38.232" v="281" actId="20577"/>
+    <pc:chgData name="Staley, Sean" userId="5b65b0e7-e88b-4844-a922-92ee8e1c9235" providerId="ADAL" clId="{7FC9E883-C68B-4964-A306-A09B374A8666}"/>
+    <pc:docChg chg="custSel addSld modSld sldOrd">
+      <pc:chgData name="Staley, Sean" userId="5b65b0e7-e88b-4844-a922-92ee8e1c9235" providerId="ADAL" clId="{7FC9E883-C68B-4964-A306-A09B374A8666}" dt="2025-09-15T19:46:58.800" v="1583" actId="20577"/>
       <pc:docMkLst>
         <pc:docMk/>
       </pc:docMkLst>
-      <pc:sldChg chg="modSp ord">
-        <pc:chgData name="Staley, Sean" userId="S::ststal01@louisville.edu::5b65b0e7-e88b-4844-a922-92ee8e1c9235" providerId="AD" clId="Web-{6E268690-6EDC-BB23-CFFA-DB7A7D5359F5}" dt="2025-09-12T03:54:08.747" v="8"/>
+      <pc:sldChg chg="modSp mod">
+        <pc:chgData name="Staley, Sean" userId="5b65b0e7-e88b-4844-a922-92ee8e1c9235" providerId="ADAL" clId="{7FC9E883-C68B-4964-A306-A09B374A8666}" dt="2025-09-15T17:34:32.096" v="1568" actId="20577"/>
+        <pc:sldMkLst>
+          <pc:docMk/>
+          <pc:sldMk cId="109857222" sldId="256"/>
+        </pc:sldMkLst>
+        <pc:spChg chg="mod">
+          <ac:chgData name="Staley, Sean" userId="5b65b0e7-e88b-4844-a922-92ee8e1c9235" providerId="ADAL" clId="{7FC9E883-C68B-4964-A306-A09B374A8666}" dt="2025-09-11T18:38:04.094" v="120" actId="20577"/>
+          <ac:spMkLst>
+            <pc:docMk/>
+            <pc:sldMk cId="109857222" sldId="256"/>
+            <ac:spMk id="2" creationId="{00000000-0000-0000-0000-000000000000}"/>
+          </ac:spMkLst>
+        </pc:spChg>
+        <pc:spChg chg="mod">
+          <ac:chgData name="Staley, Sean" userId="5b65b0e7-e88b-4844-a922-92ee8e1c9235" providerId="ADAL" clId="{7FC9E883-C68B-4964-A306-A09B374A8666}" dt="2025-09-15T17:34:32.096" v="1568" actId="20577"/>
+          <ac:spMkLst>
+            <pc:docMk/>
+            <pc:sldMk cId="109857222" sldId="256"/>
+            <ac:spMk id="3" creationId="{00000000-0000-0000-0000-000000000000}"/>
+          </ac:spMkLst>
+        </pc:spChg>
+      </pc:sldChg>
+      <pc:sldChg chg="modSp new mod ord">
+        <pc:chgData name="Staley, Sean" userId="5b65b0e7-e88b-4844-a922-92ee8e1c9235" providerId="ADAL" clId="{7FC9E883-C68B-4964-A306-A09B374A8666}" dt="2025-09-11T18:46:01.458" v="180"/>
         <pc:sldMkLst>
           <pc:docMk/>
           <pc:sldMk cId="2103210548" sldId="257"/>
         </pc:sldMkLst>
       </pc:sldChg>
-      <pc:sldChg chg="ord">
-        <pc:chgData name="Staley, Sean" userId="S::ststal01@louisville.edu::5b65b0e7-e88b-4844-a922-92ee8e1c9235" providerId="AD" clId="Web-{6E268690-6EDC-BB23-CFFA-DB7A7D5359F5}" dt="2025-09-12T03:54:10.934" v="9"/>
+      <pc:sldChg chg="modSp new mod ord">
+        <pc:chgData name="Staley, Sean" userId="5b65b0e7-e88b-4844-a922-92ee8e1c9235" providerId="ADAL" clId="{7FC9E883-C68B-4964-A306-A09B374A8666}" dt="2025-09-11T18:46:02.645" v="182"/>
         <pc:sldMkLst>
           <pc:docMk/>
           <pc:sldMk cId="651332071" sldId="258"/>
         </pc:sldMkLst>
       </pc:sldChg>
-      <pc:sldChg chg="modSp ord">
-        <pc:chgData name="Staley, Sean" userId="S::ststal01@louisville.edu::5b65b0e7-e88b-4844-a922-92ee8e1c9235" providerId="AD" clId="Web-{6E268690-6EDC-BB23-CFFA-DB7A7D5359F5}" dt="2025-09-12T03:53:58.200" v="7" actId="20577"/>
+      <pc:sldChg chg="modSp new mod ord">
+        <pc:chgData name="Staley, Sean" userId="5b65b0e7-e88b-4844-a922-92ee8e1c9235" providerId="ADAL" clId="{7FC9E883-C68B-4964-A306-A09B374A8666}" dt="2025-09-11T19:45:32.862" v="859"/>
         <pc:sldMkLst>
           <pc:docMk/>
           <pc:sldMk cId="1203497075" sldId="259"/>
         </pc:sldMkLst>
+        <pc:spChg chg="mod">
+          <ac:chgData name="Staley, Sean" userId="5b65b0e7-e88b-4844-a922-92ee8e1c9235" providerId="ADAL" clId="{7FC9E883-C68B-4964-A306-A09B374A8666}" dt="2025-09-11T18:45:47.730" v="176" actId="20577"/>
+          <ac:spMkLst>
+            <pc:docMk/>
+            <pc:sldMk cId="1203497075" sldId="259"/>
+            <ac:spMk id="2" creationId="{F679F07B-D825-751A-767B-C738909C15C6}"/>
+          </ac:spMkLst>
+        </pc:spChg>
       </pc:sldChg>
-      <pc:sldChg chg="del">
-        <pc:chgData name="Staley, Sean" userId="S::ststal01@louisville.edu::5b65b0e7-e88b-4844-a922-92ee8e1c9235" providerId="AD" clId="Web-{6E268690-6EDC-BB23-CFFA-DB7A7D5359F5}" dt="2025-09-12T03:54:20.169" v="10"/>
+      <pc:sldChg chg="modSp new mod ord">
+        <pc:chgData name="Staley, Sean" userId="5b65b0e7-e88b-4844-a922-92ee8e1c9235" providerId="ADAL" clId="{7FC9E883-C68B-4964-A306-A09B374A8666}" dt="2025-09-11T19:48:06.346" v="962" actId="20577"/>
         <pc:sldMkLst>
           <pc:docMk/>
           <pc:sldMk cId="3109130739" sldId="260"/>
         </pc:sldMkLst>
       </pc:sldChg>
-      <pc:sldChg chg="modSp">
-        <pc:chgData name="Staley, Sean" userId="S::ststal01@louisville.edu::5b65b0e7-e88b-4844-a922-92ee8e1c9235" providerId="AD" clId="Web-{6E268690-6EDC-BB23-CFFA-DB7A7D5359F5}" dt="2025-09-12T03:59:06.153" v="104" actId="20577"/>
+      <pc:sldChg chg="modSp new mod">
+        <pc:chgData name="Staley, Sean" userId="5b65b0e7-e88b-4844-a922-92ee8e1c9235" providerId="ADAL" clId="{7FC9E883-C68B-4964-A306-A09B374A8666}" dt="2025-09-11T18:46:28.494" v="216" actId="20577"/>
+        <pc:sldMkLst>
+          <pc:docMk/>
+          <pc:sldMk cId="3752665594" sldId="261"/>
+        </pc:sldMkLst>
+        <pc:spChg chg="mod">
+          <ac:chgData name="Staley, Sean" userId="5b65b0e7-e88b-4844-a922-92ee8e1c9235" providerId="ADAL" clId="{7FC9E883-C68B-4964-A306-A09B374A8666}" dt="2025-09-11T18:46:28.494" v="216" actId="20577"/>
+          <ac:spMkLst>
+            <pc:docMk/>
+            <pc:sldMk cId="3752665594" sldId="261"/>
+            <ac:spMk id="2" creationId="{0D3F6A2D-1E9A-23C7-F636-E9BCC9CC4070}"/>
+          </ac:spMkLst>
+        </pc:spChg>
+      </pc:sldChg>
+      <pc:sldChg chg="modSp new mod">
+        <pc:chgData name="Staley, Sean" userId="5b65b0e7-e88b-4844-a922-92ee8e1c9235" providerId="ADAL" clId="{7FC9E883-C68B-4964-A306-A09B374A8666}" dt="2025-09-11T18:46:59.616" v="233" actId="20577"/>
+        <pc:sldMkLst>
+          <pc:docMk/>
+          <pc:sldMk cId="841713580" sldId="262"/>
+        </pc:sldMkLst>
+        <pc:spChg chg="mod">
+          <ac:chgData name="Staley, Sean" userId="5b65b0e7-e88b-4844-a922-92ee8e1c9235" providerId="ADAL" clId="{7FC9E883-C68B-4964-A306-A09B374A8666}" dt="2025-09-11T18:46:59.616" v="233" actId="20577"/>
+          <ac:spMkLst>
+            <pc:docMk/>
+            <pc:sldMk cId="841713580" sldId="262"/>
+            <ac:spMk id="2" creationId="{9FF8F889-CF76-D5A4-E7B2-B45D441500C2}"/>
+          </ac:spMkLst>
+        </pc:spChg>
+      </pc:sldChg>
+      <pc:sldChg chg="modSp add mod">
+        <pc:chgData name="Staley, Sean" userId="5b65b0e7-e88b-4844-a922-92ee8e1c9235" providerId="ADAL" clId="{7FC9E883-C68B-4964-A306-A09B374A8666}" dt="2025-09-11T19:52:30.114" v="1515" actId="20577"/>
         <pc:sldMkLst>
           <pc:docMk/>
           <pc:sldMk cId="2835959447" sldId="263"/>
         </pc:sldMkLst>
         <pc:spChg chg="mod">
-          <ac:chgData name="Staley, Sean" userId="S::ststal01@louisville.edu::5b65b0e7-e88b-4844-a922-92ee8e1c9235" providerId="AD" clId="Web-{6E268690-6EDC-BB23-CFFA-DB7A7D5359F5}" dt="2025-09-12T03:59:06.153" v="104" actId="20577"/>
+          <ac:chgData name="Staley, Sean" userId="5b65b0e7-e88b-4844-a922-92ee8e1c9235" providerId="ADAL" clId="{7FC9E883-C68B-4964-A306-A09B374A8666}" dt="2025-09-11T19:52:30.114" v="1515" actId="20577"/>
           <ac:spMkLst>
             <pc:docMk/>
             <pc:sldMk cId="2835959447" sldId="263"/>
@@ -442,14 +647,14 @@
           </ac:spMkLst>
         </pc:spChg>
       </pc:sldChg>
-      <pc:sldChg chg="modSp">
-        <pc:chgData name="Staley, Sean" userId="S::ststal01@louisville.edu::5b65b0e7-e88b-4844-a922-92ee8e1c9235" providerId="AD" clId="Web-{6E268690-6EDC-BB23-CFFA-DB7A7D5359F5}" dt="2025-09-12T03:55:33.919" v="24" actId="20577"/>
+      <pc:sldChg chg="modSp add mod">
+        <pc:chgData name="Staley, Sean" userId="5b65b0e7-e88b-4844-a922-92ee8e1c9235" providerId="ADAL" clId="{7FC9E883-C68B-4964-A306-A09B374A8666}" dt="2025-09-11T19:52:43.724" v="1542" actId="20577"/>
         <pc:sldMkLst>
           <pc:docMk/>
           <pc:sldMk cId="3361632356" sldId="264"/>
         </pc:sldMkLst>
         <pc:spChg chg="mod">
-          <ac:chgData name="Staley, Sean" userId="S::ststal01@louisville.edu::5b65b0e7-e88b-4844-a922-92ee8e1c9235" providerId="AD" clId="Web-{6E268690-6EDC-BB23-CFFA-DB7A7D5359F5}" dt="2025-09-12T03:55:33.919" v="24" actId="20577"/>
+          <ac:chgData name="Staley, Sean" userId="5b65b0e7-e88b-4844-a922-92ee8e1c9235" providerId="ADAL" clId="{7FC9E883-C68B-4964-A306-A09B374A8666}" dt="2025-09-11T19:52:43.724" v="1542" actId="20577"/>
           <ac:spMkLst>
             <pc:docMk/>
             <pc:sldMk cId="3361632356" sldId="264"/>
@@ -457,14 +662,14 @@
           </ac:spMkLst>
         </pc:spChg>
       </pc:sldChg>
-      <pc:sldChg chg="modSp">
-        <pc:chgData name="Staley, Sean" userId="S::ststal01@louisville.edu::5b65b0e7-e88b-4844-a922-92ee8e1c9235" providerId="AD" clId="Web-{6E268690-6EDC-BB23-CFFA-DB7A7D5359F5}" dt="2025-09-12T03:58:41.700" v="102" actId="20577"/>
+      <pc:sldChg chg="modSp add mod">
+        <pc:chgData name="Staley, Sean" userId="5b65b0e7-e88b-4844-a922-92ee8e1c9235" providerId="ADAL" clId="{7FC9E883-C68B-4964-A306-A09B374A8666}" dt="2025-09-11T19:48:30.704" v="971" actId="20577"/>
         <pc:sldMkLst>
           <pc:docMk/>
           <pc:sldMk cId="1331313356" sldId="265"/>
         </pc:sldMkLst>
         <pc:spChg chg="mod">
-          <ac:chgData name="Staley, Sean" userId="S::ststal01@louisville.edu::5b65b0e7-e88b-4844-a922-92ee8e1c9235" providerId="AD" clId="Web-{6E268690-6EDC-BB23-CFFA-DB7A7D5359F5}" dt="2025-09-12T03:58:41.700" v="102" actId="20577"/>
+          <ac:chgData name="Staley, Sean" userId="5b65b0e7-e88b-4844-a922-92ee8e1c9235" providerId="ADAL" clId="{7FC9E883-C68B-4964-A306-A09B374A8666}" dt="2025-09-11T19:48:30.704" v="971" actId="20577"/>
           <ac:spMkLst>
             <pc:docMk/>
             <pc:sldMk cId="1331313356" sldId="265"/>
@@ -472,14 +677,14 @@
           </ac:spMkLst>
         </pc:spChg>
       </pc:sldChg>
-      <pc:sldChg chg="modSp">
-        <pc:chgData name="Staley, Sean" userId="S::ststal01@louisville.edu::5b65b0e7-e88b-4844-a922-92ee8e1c9235" providerId="AD" clId="Web-{6E268690-6EDC-BB23-CFFA-DB7A7D5359F5}" dt="2025-09-12T04:02:22.107" v="198" actId="20577"/>
+      <pc:sldChg chg="modSp add mod">
+        <pc:chgData name="Staley, Sean" userId="5b65b0e7-e88b-4844-a922-92ee8e1c9235" providerId="ADAL" clId="{7FC9E883-C68B-4964-A306-A09B374A8666}" dt="2025-09-11T19:48:40.137" v="974" actId="20577"/>
         <pc:sldMkLst>
           <pc:docMk/>
           <pc:sldMk cId="2626683754" sldId="266"/>
         </pc:sldMkLst>
         <pc:spChg chg="mod">
-          <ac:chgData name="Staley, Sean" userId="S::ststal01@louisville.edu::5b65b0e7-e88b-4844-a922-92ee8e1c9235" providerId="AD" clId="Web-{6E268690-6EDC-BB23-CFFA-DB7A7D5359F5}" dt="2025-09-12T04:02:22.107" v="198" actId="20577"/>
+          <ac:chgData name="Staley, Sean" userId="5b65b0e7-e88b-4844-a922-92ee8e1c9235" providerId="ADAL" clId="{7FC9E883-C68B-4964-A306-A09B374A8666}" dt="2025-09-11T19:48:40.137" v="974" actId="20577"/>
           <ac:spMkLst>
             <pc:docMk/>
             <pc:sldMk cId="2626683754" sldId="266"/>
@@ -487,27 +692,91 @@
           </ac:spMkLst>
         </pc:spChg>
       </pc:sldChg>
-      <pc:sldChg chg="modSp add replId">
-        <pc:chgData name="Staley, Sean" userId="S::ststal01@louisville.edu::5b65b0e7-e88b-4844-a922-92ee8e1c9235" providerId="AD" clId="Web-{6E268690-6EDC-BB23-CFFA-DB7A7D5359F5}" dt="2025-09-12T04:04:38.232" v="281" actId="20577"/>
+      <pc:sldChg chg="modSp">
+        <pc:chgData name="Staley, Sean" userId="5b65b0e7-e88b-4844-a922-92ee8e1c9235" providerId="ADAL" clId="{7FC9E883-C68B-4964-A306-A09B374A8666}" dt="2025-09-15T19:46:58.800" v="1583" actId="20577"/>
         <pc:sldMkLst>
           <pc:docMk/>
-          <pc:sldMk cId="2910431911" sldId="267"/>
+          <pc:sldMk cId="2470439829" sldId="269"/>
+        </pc:sldMkLst>
+        <pc:graphicFrameChg chg="mod">
+          <ac:chgData name="Staley, Sean" userId="5b65b0e7-e88b-4844-a922-92ee8e1c9235" providerId="ADAL" clId="{7FC9E883-C68B-4964-A306-A09B374A8666}" dt="2025-09-15T19:46:58.800" v="1583" actId="20577"/>
+          <ac:graphicFrameMkLst>
+            <pc:docMk/>
+            <pc:sldMk cId="2470439829" sldId="269"/>
+            <ac:graphicFrameMk id="5" creationId="{D560014D-43C3-C8AB-BF42-E9B676CB26D9}"/>
+          </ac:graphicFrameMkLst>
+        </pc:graphicFrameChg>
+      </pc:sldChg>
+    </pc:docChg>
+  </pc:docChgLst>
+  <pc:docChgLst>
+    <pc:chgData name="Staley, Sean" userId="S::ststal01@louisville.edu::5b65b0e7-e88b-4844-a922-92ee8e1c9235" providerId="AD" clId="Web-{0B628515-F15E-3094-62B4-A5FD419F3608}"/>
+    <pc:docChg chg="modSld">
+      <pc:chgData name="Staley, Sean" userId="S::ststal01@louisville.edu::5b65b0e7-e88b-4844-a922-92ee8e1c9235" providerId="AD" clId="Web-{0B628515-F15E-3094-62B4-A5FD419F3608}" dt="2025-09-16T01:11:31.941" v="13" actId="1076"/>
+      <pc:docMkLst>
+        <pc:docMk/>
+      </pc:docMkLst>
+      <pc:sldChg chg="modSp">
+        <pc:chgData name="Staley, Sean" userId="S::ststal01@louisville.edu::5b65b0e7-e88b-4844-a922-92ee8e1c9235" providerId="AD" clId="Web-{0B628515-F15E-3094-62B4-A5FD419F3608}" dt="2025-09-16T01:11:31.941" v="13" actId="1076"/>
+        <pc:sldMkLst>
+          <pc:docMk/>
+          <pc:sldMk cId="2470439829" sldId="269"/>
+        </pc:sldMkLst>
+        <pc:graphicFrameChg chg="mod modGraphic">
+          <ac:chgData name="Staley, Sean" userId="S::ststal01@louisville.edu::5b65b0e7-e88b-4844-a922-92ee8e1c9235" providerId="AD" clId="Web-{0B628515-F15E-3094-62B4-A5FD419F3608}" dt="2025-09-16T01:11:31.941" v="13" actId="1076"/>
+          <ac:graphicFrameMkLst>
+            <pc:docMk/>
+            <pc:sldMk cId="2470439829" sldId="269"/>
+            <ac:graphicFrameMk id="5" creationId="{D560014D-43C3-C8AB-BF42-E9B676CB26D9}"/>
+          </ac:graphicFrameMkLst>
+        </pc:graphicFrameChg>
+      </pc:sldChg>
+    </pc:docChg>
+  </pc:docChgLst>
+  <pc:docChgLst>
+    <pc:chgData name="Staley, Sean" userId="S::ststal01@louisville.edu::5b65b0e7-e88b-4844-a922-92ee8e1c9235" providerId="AD" clId="Web-{765B6454-1945-B9A9-DB4F-4D8891203318}"/>
+    <pc:docChg chg="modSld">
+      <pc:chgData name="Staley, Sean" userId="S::ststal01@louisville.edu::5b65b0e7-e88b-4844-a922-92ee8e1c9235" providerId="AD" clId="Web-{765B6454-1945-B9A9-DB4F-4D8891203318}" dt="2025-09-16T01:10:09.903" v="45" actId="20577"/>
+      <pc:docMkLst>
+        <pc:docMk/>
+      </pc:docMkLst>
+      <pc:sldChg chg="modSp">
+        <pc:chgData name="Staley, Sean" userId="S::ststal01@louisville.edu::5b65b0e7-e88b-4844-a922-92ee8e1c9235" providerId="AD" clId="Web-{765B6454-1945-B9A9-DB4F-4D8891203318}" dt="2025-09-16T01:10:09.903" v="45" actId="20577"/>
+        <pc:sldMkLst>
+          <pc:docMk/>
+          <pc:sldMk cId="841713580" sldId="262"/>
         </pc:sldMkLst>
         <pc:spChg chg="mod">
-          <ac:chgData name="Staley, Sean" userId="S::ststal01@louisville.edu::5b65b0e7-e88b-4844-a922-92ee8e1c9235" providerId="AD" clId="Web-{6E268690-6EDC-BB23-CFFA-DB7A7D5359F5}" dt="2025-09-12T04:04:38.232" v="281" actId="20577"/>
+          <ac:chgData name="Staley, Sean" userId="S::ststal01@louisville.edu::5b65b0e7-e88b-4844-a922-92ee8e1c9235" providerId="AD" clId="Web-{765B6454-1945-B9A9-DB4F-4D8891203318}" dt="2025-09-16T01:10:09.903" v="45" actId="20577"/>
           <ac:spMkLst>
             <pc:docMk/>
-            <pc:sldMk cId="2910431911" sldId="267"/>
-            <ac:spMk id="3" creationId="{DFB20121-A57A-8A22-129F-2C0D0ACD4ADD}"/>
+            <pc:sldMk cId="841713580" sldId="262"/>
+            <ac:spMk id="2" creationId="{9FF8F889-CF76-D5A4-E7B2-B45D441500C2}"/>
           </ac:spMkLst>
         </pc:spChg>
+        <pc:graphicFrameChg chg="modGraphic">
+          <ac:chgData name="Staley, Sean" userId="S::ststal01@louisville.edu::5b65b0e7-e88b-4844-a922-92ee8e1c9235" providerId="AD" clId="Web-{765B6454-1945-B9A9-DB4F-4D8891203318}" dt="2025-09-16T00:55:28.751" v="17" actId="20577"/>
+          <ac:graphicFrameMkLst>
+            <pc:docMk/>
+            <pc:sldMk cId="841713580" sldId="262"/>
+            <ac:graphicFrameMk id="14" creationId="{868F9BFE-6833-8CBF-8623-01001157DB58}"/>
+          </ac:graphicFrameMkLst>
+        </pc:graphicFrameChg>
       </pc:sldChg>
-      <pc:sldChg chg="new del">
-        <pc:chgData name="Staley, Sean" userId="S::ststal01@louisville.edu::5b65b0e7-e88b-4844-a922-92ee8e1c9235" providerId="AD" clId="Web-{6E268690-6EDC-BB23-CFFA-DB7A7D5359F5}" dt="2025-09-12T04:02:43.169" v="200"/>
+      <pc:sldChg chg="modSp">
+        <pc:chgData name="Staley, Sean" userId="S::ststal01@louisville.edu::5b65b0e7-e88b-4844-a922-92ee8e1c9235" providerId="AD" clId="Web-{765B6454-1945-B9A9-DB4F-4D8891203318}" dt="2025-09-16T01:10:05.809" v="43" actId="20577"/>
         <pc:sldMkLst>
           <pc:docMk/>
-          <pc:sldMk cId="3723843586" sldId="267"/>
+          <pc:sldMk cId="2470439829" sldId="269"/>
         </pc:sldMkLst>
+        <pc:graphicFrameChg chg="modGraphic">
+          <ac:chgData name="Staley, Sean" userId="S::ststal01@louisville.edu::5b65b0e7-e88b-4844-a922-92ee8e1c9235" providerId="AD" clId="Web-{765B6454-1945-B9A9-DB4F-4D8891203318}" dt="2025-09-16T01:10:05.809" v="43" actId="20577"/>
+          <ac:graphicFrameMkLst>
+            <pc:docMk/>
+            <pc:sldMk cId="2470439829" sldId="269"/>
+            <ac:graphicFrameMk id="5" creationId="{D560014D-43C3-C8AB-BF42-E9B676CB26D9}"/>
+          </ac:graphicFrameMkLst>
+        </pc:graphicFrameChg>
       </pc:sldChg>
     </pc:docChg>
   </pc:docChgLst>
@@ -891,179 +1160,6 @@
       </pc:sldMasterChg>
     </pc:docChg>
   </pc:docChgLst>
-  <pc:docChgLst>
-    <pc:chgData name="Staley, Sean" userId="5b65b0e7-e88b-4844-a922-92ee8e1c9235" providerId="ADAL" clId="{7FC9E883-C68B-4964-A306-A09B374A8666}"/>
-    <pc:docChg chg="custSel addSld modSld sldOrd">
-      <pc:chgData name="Staley, Sean" userId="5b65b0e7-e88b-4844-a922-92ee8e1c9235" providerId="ADAL" clId="{7FC9E883-C68B-4964-A306-A09B374A8666}" dt="2025-09-15T19:46:58.800" v="1583" actId="20577"/>
-      <pc:docMkLst>
-        <pc:docMk/>
-      </pc:docMkLst>
-      <pc:sldChg chg="modSp mod">
-        <pc:chgData name="Staley, Sean" userId="5b65b0e7-e88b-4844-a922-92ee8e1c9235" providerId="ADAL" clId="{7FC9E883-C68B-4964-A306-A09B374A8666}" dt="2025-09-15T17:34:32.096" v="1568" actId="20577"/>
-        <pc:sldMkLst>
-          <pc:docMk/>
-          <pc:sldMk cId="109857222" sldId="256"/>
-        </pc:sldMkLst>
-        <pc:spChg chg="mod">
-          <ac:chgData name="Staley, Sean" userId="5b65b0e7-e88b-4844-a922-92ee8e1c9235" providerId="ADAL" clId="{7FC9E883-C68B-4964-A306-A09B374A8666}" dt="2025-09-11T18:38:04.094" v="120" actId="20577"/>
-          <ac:spMkLst>
-            <pc:docMk/>
-            <pc:sldMk cId="109857222" sldId="256"/>
-            <ac:spMk id="2" creationId="{00000000-0000-0000-0000-000000000000}"/>
-          </ac:spMkLst>
-        </pc:spChg>
-        <pc:spChg chg="mod">
-          <ac:chgData name="Staley, Sean" userId="5b65b0e7-e88b-4844-a922-92ee8e1c9235" providerId="ADAL" clId="{7FC9E883-C68B-4964-A306-A09B374A8666}" dt="2025-09-15T17:34:32.096" v="1568" actId="20577"/>
-          <ac:spMkLst>
-            <pc:docMk/>
-            <pc:sldMk cId="109857222" sldId="256"/>
-            <ac:spMk id="3" creationId="{00000000-0000-0000-0000-000000000000}"/>
-          </ac:spMkLst>
-        </pc:spChg>
-      </pc:sldChg>
-      <pc:sldChg chg="modSp new mod ord">
-        <pc:chgData name="Staley, Sean" userId="5b65b0e7-e88b-4844-a922-92ee8e1c9235" providerId="ADAL" clId="{7FC9E883-C68B-4964-A306-A09B374A8666}" dt="2025-09-11T18:46:01.458" v="180"/>
-        <pc:sldMkLst>
-          <pc:docMk/>
-          <pc:sldMk cId="2103210548" sldId="257"/>
-        </pc:sldMkLst>
-      </pc:sldChg>
-      <pc:sldChg chg="modSp new mod ord">
-        <pc:chgData name="Staley, Sean" userId="5b65b0e7-e88b-4844-a922-92ee8e1c9235" providerId="ADAL" clId="{7FC9E883-C68B-4964-A306-A09B374A8666}" dt="2025-09-11T18:46:02.645" v="182"/>
-        <pc:sldMkLst>
-          <pc:docMk/>
-          <pc:sldMk cId="651332071" sldId="258"/>
-        </pc:sldMkLst>
-      </pc:sldChg>
-      <pc:sldChg chg="modSp new mod ord">
-        <pc:chgData name="Staley, Sean" userId="5b65b0e7-e88b-4844-a922-92ee8e1c9235" providerId="ADAL" clId="{7FC9E883-C68B-4964-A306-A09B374A8666}" dt="2025-09-11T19:45:32.862" v="859"/>
-        <pc:sldMkLst>
-          <pc:docMk/>
-          <pc:sldMk cId="1203497075" sldId="259"/>
-        </pc:sldMkLst>
-        <pc:spChg chg="mod">
-          <ac:chgData name="Staley, Sean" userId="5b65b0e7-e88b-4844-a922-92ee8e1c9235" providerId="ADAL" clId="{7FC9E883-C68B-4964-A306-A09B374A8666}" dt="2025-09-11T18:45:47.730" v="176" actId="20577"/>
-          <ac:spMkLst>
-            <pc:docMk/>
-            <pc:sldMk cId="1203497075" sldId="259"/>
-            <ac:spMk id="2" creationId="{F679F07B-D825-751A-767B-C738909C15C6}"/>
-          </ac:spMkLst>
-        </pc:spChg>
-      </pc:sldChg>
-      <pc:sldChg chg="modSp new mod ord">
-        <pc:chgData name="Staley, Sean" userId="5b65b0e7-e88b-4844-a922-92ee8e1c9235" providerId="ADAL" clId="{7FC9E883-C68B-4964-A306-A09B374A8666}" dt="2025-09-11T19:48:06.346" v="962" actId="20577"/>
-        <pc:sldMkLst>
-          <pc:docMk/>
-          <pc:sldMk cId="3109130739" sldId="260"/>
-        </pc:sldMkLst>
-      </pc:sldChg>
-      <pc:sldChg chg="modSp new mod">
-        <pc:chgData name="Staley, Sean" userId="5b65b0e7-e88b-4844-a922-92ee8e1c9235" providerId="ADAL" clId="{7FC9E883-C68B-4964-A306-A09B374A8666}" dt="2025-09-11T18:46:28.494" v="216" actId="20577"/>
-        <pc:sldMkLst>
-          <pc:docMk/>
-          <pc:sldMk cId="3752665594" sldId="261"/>
-        </pc:sldMkLst>
-        <pc:spChg chg="mod">
-          <ac:chgData name="Staley, Sean" userId="5b65b0e7-e88b-4844-a922-92ee8e1c9235" providerId="ADAL" clId="{7FC9E883-C68B-4964-A306-A09B374A8666}" dt="2025-09-11T18:46:28.494" v="216" actId="20577"/>
-          <ac:spMkLst>
-            <pc:docMk/>
-            <pc:sldMk cId="3752665594" sldId="261"/>
-            <ac:spMk id="2" creationId="{0D3F6A2D-1E9A-23C7-F636-E9BCC9CC4070}"/>
-          </ac:spMkLst>
-        </pc:spChg>
-      </pc:sldChg>
-      <pc:sldChg chg="modSp new mod">
-        <pc:chgData name="Staley, Sean" userId="5b65b0e7-e88b-4844-a922-92ee8e1c9235" providerId="ADAL" clId="{7FC9E883-C68B-4964-A306-A09B374A8666}" dt="2025-09-11T18:46:59.616" v="233" actId="20577"/>
-        <pc:sldMkLst>
-          <pc:docMk/>
-          <pc:sldMk cId="841713580" sldId="262"/>
-        </pc:sldMkLst>
-        <pc:spChg chg="mod">
-          <ac:chgData name="Staley, Sean" userId="5b65b0e7-e88b-4844-a922-92ee8e1c9235" providerId="ADAL" clId="{7FC9E883-C68B-4964-A306-A09B374A8666}" dt="2025-09-11T18:46:59.616" v="233" actId="20577"/>
-          <ac:spMkLst>
-            <pc:docMk/>
-            <pc:sldMk cId="841713580" sldId="262"/>
-            <ac:spMk id="2" creationId="{9FF8F889-CF76-D5A4-E7B2-B45D441500C2}"/>
-          </ac:spMkLst>
-        </pc:spChg>
-      </pc:sldChg>
-      <pc:sldChg chg="modSp add mod">
-        <pc:chgData name="Staley, Sean" userId="5b65b0e7-e88b-4844-a922-92ee8e1c9235" providerId="ADAL" clId="{7FC9E883-C68B-4964-A306-A09B374A8666}" dt="2025-09-11T19:52:30.114" v="1515" actId="20577"/>
-        <pc:sldMkLst>
-          <pc:docMk/>
-          <pc:sldMk cId="2835959447" sldId="263"/>
-        </pc:sldMkLst>
-        <pc:spChg chg="mod">
-          <ac:chgData name="Staley, Sean" userId="5b65b0e7-e88b-4844-a922-92ee8e1c9235" providerId="ADAL" clId="{7FC9E883-C68B-4964-A306-A09B374A8666}" dt="2025-09-11T19:52:30.114" v="1515" actId="20577"/>
-          <ac:spMkLst>
-            <pc:docMk/>
-            <pc:sldMk cId="2835959447" sldId="263"/>
-            <ac:spMk id="3" creationId="{FD21E7DD-17EB-7AAE-18F0-3811F164F20C}"/>
-          </ac:spMkLst>
-        </pc:spChg>
-      </pc:sldChg>
-      <pc:sldChg chg="modSp add mod">
-        <pc:chgData name="Staley, Sean" userId="5b65b0e7-e88b-4844-a922-92ee8e1c9235" providerId="ADAL" clId="{7FC9E883-C68B-4964-A306-A09B374A8666}" dt="2025-09-11T19:52:43.724" v="1542" actId="20577"/>
-        <pc:sldMkLst>
-          <pc:docMk/>
-          <pc:sldMk cId="3361632356" sldId="264"/>
-        </pc:sldMkLst>
-        <pc:spChg chg="mod">
-          <ac:chgData name="Staley, Sean" userId="5b65b0e7-e88b-4844-a922-92ee8e1c9235" providerId="ADAL" clId="{7FC9E883-C68B-4964-A306-A09B374A8666}" dt="2025-09-11T19:52:43.724" v="1542" actId="20577"/>
-          <ac:spMkLst>
-            <pc:docMk/>
-            <pc:sldMk cId="3361632356" sldId="264"/>
-            <ac:spMk id="3" creationId="{3EB76FBE-AAE9-8202-E038-8C6A1184DF99}"/>
-          </ac:spMkLst>
-        </pc:spChg>
-      </pc:sldChg>
-      <pc:sldChg chg="modSp add mod">
-        <pc:chgData name="Staley, Sean" userId="5b65b0e7-e88b-4844-a922-92ee8e1c9235" providerId="ADAL" clId="{7FC9E883-C68B-4964-A306-A09B374A8666}" dt="2025-09-11T19:48:30.704" v="971" actId="20577"/>
-        <pc:sldMkLst>
-          <pc:docMk/>
-          <pc:sldMk cId="1331313356" sldId="265"/>
-        </pc:sldMkLst>
-        <pc:spChg chg="mod">
-          <ac:chgData name="Staley, Sean" userId="5b65b0e7-e88b-4844-a922-92ee8e1c9235" providerId="ADAL" clId="{7FC9E883-C68B-4964-A306-A09B374A8666}" dt="2025-09-11T19:48:30.704" v="971" actId="20577"/>
-          <ac:spMkLst>
-            <pc:docMk/>
-            <pc:sldMk cId="1331313356" sldId="265"/>
-            <ac:spMk id="3" creationId="{50051190-FAC9-608A-B999-7887E434E599}"/>
-          </ac:spMkLst>
-        </pc:spChg>
-      </pc:sldChg>
-      <pc:sldChg chg="modSp add mod">
-        <pc:chgData name="Staley, Sean" userId="5b65b0e7-e88b-4844-a922-92ee8e1c9235" providerId="ADAL" clId="{7FC9E883-C68B-4964-A306-A09B374A8666}" dt="2025-09-11T19:48:40.137" v="974" actId="20577"/>
-        <pc:sldMkLst>
-          <pc:docMk/>
-          <pc:sldMk cId="2626683754" sldId="266"/>
-        </pc:sldMkLst>
-        <pc:spChg chg="mod">
-          <ac:chgData name="Staley, Sean" userId="5b65b0e7-e88b-4844-a922-92ee8e1c9235" providerId="ADAL" clId="{7FC9E883-C68B-4964-A306-A09B374A8666}" dt="2025-09-11T19:48:40.137" v="974" actId="20577"/>
-          <ac:spMkLst>
-            <pc:docMk/>
-            <pc:sldMk cId="2626683754" sldId="266"/>
-            <ac:spMk id="3" creationId="{39660FE2-EB95-4EE1-FCD9-D7A320C01092}"/>
-          </ac:spMkLst>
-        </pc:spChg>
-      </pc:sldChg>
-      <pc:sldChg chg="modSp">
-        <pc:chgData name="Staley, Sean" userId="5b65b0e7-e88b-4844-a922-92ee8e1c9235" providerId="ADAL" clId="{7FC9E883-C68B-4964-A306-A09B374A8666}" dt="2025-09-15T19:46:58.800" v="1583" actId="20577"/>
-        <pc:sldMkLst>
-          <pc:docMk/>
-          <pc:sldMk cId="2470439829" sldId="269"/>
-        </pc:sldMkLst>
-        <pc:graphicFrameChg chg="mod">
-          <ac:chgData name="Staley, Sean" userId="5b65b0e7-e88b-4844-a922-92ee8e1c9235" providerId="ADAL" clId="{7FC9E883-C68B-4964-A306-A09B374A8666}" dt="2025-09-15T19:46:58.800" v="1583" actId="20577"/>
-          <ac:graphicFrameMkLst>
-            <pc:docMk/>
-            <pc:sldMk cId="2470439829" sldId="269"/>
-            <ac:graphicFrameMk id="5" creationId="{D560014D-43C3-C8AB-BF42-E9B676CB26D9}"/>
-          </ac:graphicFrameMkLst>
-        </pc:graphicFrameChg>
-      </pc:sldChg>
-    </pc:docChg>
-  </pc:docChgLst>
 </pc:chgInfo>
 </file>
 
@@ -4572,13 +4668,17 @@
         <a:bodyPr/>
         <a:lstStyle/>
         <a:p>
-          <a:pPr>
+          <a:pPr algn="l">
             <a:lnSpc>
               <a:spcPct val="100000"/>
             </a:lnSpc>
           </a:pPr>
           <a:r>
-            <a:rPr lang="en-US"/>
+            <a:rPr lang="en-US" sz="2600" dirty="0">
+              <a:latin typeface="Franklin Gothic Medium"/>
+              <a:ea typeface="+mn-ea"/>
+              <a:cs typeface="+mn-cs"/>
+            </a:rPr>
             <a:t>FR1 – Website Form Submission</a:t>
           </a:r>
         </a:p>
@@ -4613,13 +4713,17 @@
         <a:bodyPr/>
         <a:lstStyle/>
         <a:p>
-          <a:pPr>
+          <a:pPr algn="l">
             <a:lnSpc>
               <a:spcPct val="100000"/>
             </a:lnSpc>
           </a:pPr>
           <a:r>
-            <a:rPr lang="en-US"/>
+            <a:rPr lang="en-US" sz="2600" dirty="0">
+              <a:latin typeface="Franklin Gothic Medium"/>
+              <a:ea typeface="+mn-ea"/>
+              <a:cs typeface="+mn-cs"/>
+            </a:rPr>
             <a:t>FR2 – Submission Handling in Backend</a:t>
           </a:r>
         </a:p>
@@ -4654,13 +4758,17 @@
         <a:bodyPr/>
         <a:lstStyle/>
         <a:p>
-          <a:pPr>
+          <a:pPr algn="l">
             <a:lnSpc>
               <a:spcPct val="100000"/>
             </a:lnSpc>
           </a:pPr>
           <a:r>
-            <a:rPr lang="en-US"/>
+            <a:rPr lang="en-US" sz="2600" dirty="0">
+              <a:latin typeface="Franklin Gothic Medium"/>
+              <a:ea typeface="+mn-ea"/>
+              <a:cs typeface="+mn-cs"/>
+            </a:rPr>
             <a:t>FR5 – Live Order Queue</a:t>
           </a:r>
         </a:p>
@@ -4695,13 +4803,17 @@
         <a:bodyPr/>
         <a:lstStyle/>
         <a:p>
-          <a:pPr>
+          <a:pPr algn="l">
             <a:lnSpc>
               <a:spcPct val="100000"/>
             </a:lnSpc>
           </a:pPr>
           <a:r>
-            <a:rPr lang="en-US"/>
+            <a:rPr lang="en-US" sz="2600" dirty="0">
+              <a:latin typeface="Franklin Gothic Medium"/>
+              <a:ea typeface="+mn-ea"/>
+              <a:cs typeface="+mn-cs"/>
+            </a:rPr>
             <a:t>NFR3 – Cart list</a:t>
           </a:r>
         </a:p>
@@ -4736,13 +4848,17 @@
         <a:bodyPr/>
         <a:lstStyle/>
         <a:p>
-          <a:pPr>
+          <a:pPr algn="l">
             <a:lnSpc>
               <a:spcPct val="100000"/>
             </a:lnSpc>
           </a:pPr>
           <a:r>
-            <a:rPr lang="en-US"/>
+            <a:rPr lang="en-US" sz="2600" dirty="0">
+              <a:latin typeface="Franklin Gothic Medium"/>
+              <a:ea typeface="+mn-ea"/>
+              <a:cs typeface="+mn-cs"/>
+            </a:rPr>
             <a:t>NFR4 – Order Confirmation</a:t>
           </a:r>
         </a:p>
@@ -4894,16 +5010,29 @@
         <a:bodyPr/>
         <a:lstStyle/>
         <a:p>
-          <a:pPr>
+          <a:pPr rtl="0">
             <a:lnSpc>
               <a:spcPct val="100000"/>
             </a:lnSpc>
             <a:defRPr cap="all"/>
           </a:pPr>
           <a:r>
-            <a:rPr lang="en-US"/>
-            <a:t>Requirement work assignment</a:t>
+            <a:rPr lang="en-US" dirty="0">
+              <a:latin typeface="Franklin Gothic Demi Cond" panose="020B0706030402020204"/>
+            </a:rPr>
+            <a:t>Assign work</a:t>
           </a:r>
+          <a:r>
+            <a:rPr lang="en-US" dirty="0"/>
+            <a:t> </a:t>
+          </a:r>
+          <a:r>
+            <a:rPr lang="en-US" dirty="0">
+              <a:latin typeface="Franklin Gothic Demi Cond" panose="020B0706030402020204"/>
+            </a:rPr>
+            <a:t>to team</a:t>
+          </a:r>
+          <a:endParaRPr lang="en-US" dirty="0"/>
         </a:p>
       </dgm:t>
     </dgm:pt>
@@ -4943,7 +5072,7 @@
             <a:defRPr cap="all"/>
           </a:pPr>
           <a:r>
-            <a:rPr lang="en-US"/>
+            <a:rPr lang="en-US" dirty="0"/>
             <a:t>Design WebApp UI</a:t>
           </a:r>
         </a:p>
@@ -4985,7 +5114,7 @@
             <a:defRPr cap="all"/>
           </a:pPr>
           <a:r>
-            <a:rPr lang="en-US"/>
+            <a:rPr lang="en-US" dirty="0"/>
             <a:t>Develop the backend order handling</a:t>
           </a:r>
         </a:p>
@@ -5027,7 +5156,7 @@
             <a:defRPr cap="all"/>
           </a:pPr>
           <a:r>
-            <a:rPr lang="en-US"/>
+            <a:rPr lang="en-US" dirty="0"/>
             <a:t>Ensure Client Requests Reach Backend</a:t>
           </a:r>
         </a:p>
@@ -5069,7 +5198,7 @@
             <a:defRPr cap="all"/>
           </a:pPr>
           <a:r>
-            <a:rPr lang="en-US"/>
+            <a:rPr lang="en-US" dirty="0"/>
             <a:t>Testing and bug-fixing</a:t>
           </a:r>
         </a:p>
@@ -5111,7 +5240,7 @@
             <a:defRPr cap="all"/>
           </a:pPr>
           <a:r>
-            <a:rPr lang="en-US"/>
+            <a:rPr lang="en-US" dirty="0"/>
             <a:t>Release</a:t>
           </a:r>
         </a:p>
@@ -5526,11 +5655,24 @@
         <a:bodyPr/>
         <a:lstStyle/>
         <a:p>
+          <a:pPr algn="ctr">
+            <a:lnSpc>
+              <a:spcPct val="90000"/>
+            </a:lnSpc>
+          </a:pPr>
           <a:r>
-            <a:rPr lang="en-US" baseline="0"/>
+            <a:rPr lang="en-US" sz="2000" baseline="0" dirty="0">
+              <a:latin typeface="Franklin Gothic Medium" panose="020B0603020102020204"/>
+              <a:ea typeface="+mn-ea"/>
+              <a:cs typeface="+mn-cs"/>
+            </a:rPr>
             <a:t>Sean Staley – Project Manager / Frontend Engineer</a:t>
           </a:r>
-          <a:endParaRPr lang="en-US"/>
+          <a:endParaRPr lang="en-US" sz="2000" dirty="0">
+            <a:latin typeface="Franklin Gothic Medium" panose="020B0603020102020204"/>
+            <a:ea typeface="+mn-ea"/>
+            <a:cs typeface="+mn-cs"/>
+          </a:endParaRPr>
         </a:p>
       </dgm:t>
     </dgm:pt>
@@ -5563,11 +5705,24 @@
         <a:bodyPr/>
         <a:lstStyle/>
         <a:p>
+          <a:pPr algn="ctr">
+            <a:lnSpc>
+              <a:spcPct val="90000"/>
+            </a:lnSpc>
+          </a:pPr>
           <a:r>
-            <a:rPr lang="en-US" baseline="0" dirty="0"/>
+            <a:rPr lang="en-US" sz="2000" baseline="0" dirty="0">
+              <a:latin typeface="Franklin Gothic Medium" panose="020B0603020102020204"/>
+              <a:ea typeface="+mn-ea"/>
+              <a:cs typeface="+mn-cs"/>
+            </a:rPr>
             <a:t>Jaden Wattley – Backend Engineer / Product Engineer</a:t>
           </a:r>
-          <a:endParaRPr lang="en-US" dirty="0"/>
+          <a:endParaRPr lang="en-US" sz="2000" dirty="0">
+            <a:latin typeface="Franklin Gothic Medium" panose="020B0603020102020204"/>
+            <a:ea typeface="+mn-ea"/>
+            <a:cs typeface="+mn-cs"/>
+          </a:endParaRPr>
         </a:p>
       </dgm:t>
     </dgm:pt>
@@ -5600,11 +5755,27 @@
         <a:bodyPr/>
         <a:lstStyle/>
         <a:p>
+          <a:pPr algn="ctr" rtl="0">
+            <a:lnSpc>
+              <a:spcPct val="90000"/>
+            </a:lnSpc>
+          </a:pPr>
           <a:r>
-            <a:rPr lang="en-US" baseline="0" dirty="0"/>
-            <a:t>Connor Raque – None</a:t>
+            <a:rPr lang="en-US" sz="2000" baseline="0" dirty="0">
+              <a:latin typeface="Franklin Gothic Medium" panose="020B0603020102020204"/>
+              <a:ea typeface="+mn-ea"/>
+              <a:cs typeface="+mn-cs"/>
+            </a:rPr>
+            <a:t>Connor Raque – </a:t>
           </a:r>
-          <a:endParaRPr lang="en-US" dirty="0"/>
+          <a:r>
+            <a:rPr lang="en-US" sz="2000" b="1" baseline="0" dirty="0">
+              <a:latin typeface="Franklin Gothic Demi Cond" panose="020B0706030402020204"/>
+              <a:ea typeface="+mn-ea"/>
+              <a:cs typeface="+mn-cs"/>
+            </a:rPr>
+            <a:t>None</a:t>
+          </a:r>
         </a:p>
       </dgm:t>
     </dgm:pt>
@@ -5630,42 +5801,41 @@
         </a:p>
       </dgm:t>
     </dgm:pt>
-    <dgm:pt modelId="{9A95E03E-DC01-4B1B-A778-987E552C4A37}">
-      <dgm:prSet/>
+    <dgm:pt modelId="{21FD537B-64B1-480D-8097-9ED46EA0F852}">
+      <dgm:prSet phldr="0"/>
       <dgm:spPr/>
       <dgm:t>
         <a:bodyPr/>
         <a:lstStyle/>
         <a:p>
+          <a:pPr algn="ctr" rtl="0">
+            <a:lnSpc>
+              <a:spcPct val="90000"/>
+            </a:lnSpc>
+          </a:pPr>
           <a:r>
-            <a:rPr lang="en-US" baseline="0" dirty="0"/>
+            <a:rPr lang="en-US" sz="2000" baseline="0" dirty="0">
+              <a:latin typeface="Franklin Gothic Medium"/>
+              <a:ea typeface="Calibri"/>
+              <a:cs typeface="Calibri"/>
+            </a:rPr>
             <a:t>Robert Wickliffe – Full Stack Dev</a:t>
           </a:r>
-          <a:endParaRPr lang="en-US" dirty="0"/>
+          <a:endParaRPr lang="en-US" sz="2000" baseline="0" dirty="0">
+            <a:latin typeface="Franklin Gothic Medium"/>
+            <a:ea typeface="+mn-ea"/>
+            <a:cs typeface="+mn-cs"/>
+          </a:endParaRPr>
         </a:p>
       </dgm:t>
     </dgm:pt>
-    <dgm:pt modelId="{83A844AE-4F36-443B-A0D5-791049FB10C1}" type="parTrans" cxnId="{F00199F2-C0E4-449C-8056-5BA195A3BE22}">
+    <dgm:pt modelId="{55232BC7-9D25-4340-8A46-DEB64294B476}" type="parTrans" cxnId="{16937194-3172-4521-9B96-E0AB75DC8CEE}">
       <dgm:prSet/>
       <dgm:spPr/>
-      <dgm:t>
-        <a:bodyPr/>
-        <a:lstStyle/>
-        <a:p>
-          <a:endParaRPr lang="en-US"/>
-        </a:p>
-      </dgm:t>
     </dgm:pt>
-    <dgm:pt modelId="{49871633-9C95-4A64-ABD2-BEE24AF8C735}" type="sibTrans" cxnId="{F00199F2-C0E4-449C-8056-5BA195A3BE22}">
+    <dgm:pt modelId="{60A3A506-9D37-4933-8161-823955E3C611}" type="sibTrans" cxnId="{16937194-3172-4521-9B96-E0AB75DC8CEE}">
       <dgm:prSet/>
       <dgm:spPr/>
-      <dgm:t>
-        <a:bodyPr/>
-        <a:lstStyle/>
-        <a:p>
-          <a:endParaRPr lang="en-US"/>
-        </a:p>
-      </dgm:t>
     </dgm:pt>
     <dgm:pt modelId="{665A7224-D66A-45F7-ADCF-B121A06EB3AB}" type="pres">
       <dgm:prSet presAssocID="{803F9C41-0B7C-46D5-A84A-51E688A3D601}" presName="hierChild1" presStyleCnt="0">
@@ -5727,6 +5897,30 @@
       <dgm:prSet presAssocID="{C4698E69-17CF-4858-B15F-B6028C352A2D}" presName="hierChild2" presStyleCnt="0"/>
       <dgm:spPr/>
     </dgm:pt>
+    <dgm:pt modelId="{9549A2D0-7975-4C25-BCA2-6AED093AEAA1}" type="pres">
+      <dgm:prSet presAssocID="{21FD537B-64B1-480D-8097-9ED46EA0F852}" presName="hierRoot1" presStyleCnt="0"/>
+      <dgm:spPr/>
+    </dgm:pt>
+    <dgm:pt modelId="{79A734A8-9E64-4892-B7DD-62DD6A1999FD}" type="pres">
+      <dgm:prSet presAssocID="{21FD537B-64B1-480D-8097-9ED46EA0F852}" presName="composite" presStyleCnt="0"/>
+      <dgm:spPr/>
+    </dgm:pt>
+    <dgm:pt modelId="{23DBA986-D6A4-459F-927C-6C8164FF1B1C}" type="pres">
+      <dgm:prSet presAssocID="{21FD537B-64B1-480D-8097-9ED46EA0F852}" presName="background" presStyleLbl="node0" presStyleIdx="2" presStyleCnt="4"/>
+      <dgm:spPr/>
+    </dgm:pt>
+    <dgm:pt modelId="{3B264F07-3314-4445-BE95-79F6325640B9}" type="pres">
+      <dgm:prSet presAssocID="{21FD537B-64B1-480D-8097-9ED46EA0F852}" presName="text" presStyleLbl="fgAcc0" presStyleIdx="2" presStyleCnt="4">
+        <dgm:presLayoutVars>
+          <dgm:chPref val="3"/>
+        </dgm:presLayoutVars>
+      </dgm:prSet>
+      <dgm:spPr/>
+    </dgm:pt>
+    <dgm:pt modelId="{297E22DE-B0A9-44D6-A316-A6B304F62F28}" type="pres">
+      <dgm:prSet presAssocID="{21FD537B-64B1-480D-8097-9ED46EA0F852}" presName="hierChild2" presStyleCnt="0"/>
+      <dgm:spPr/>
+    </dgm:pt>
     <dgm:pt modelId="{D8B4281E-F199-4868-8408-9067B2DECB4E}" type="pres">
       <dgm:prSet presAssocID="{6C30B1F0-A681-4A70-A6F8-00657A10747A}" presName="hierRoot1" presStyleCnt="0"/>
       <dgm:spPr/>
@@ -5736,11 +5930,11 @@
       <dgm:spPr/>
     </dgm:pt>
     <dgm:pt modelId="{0C161332-3E82-4DD7-B9E2-603B911773F0}" type="pres">
-      <dgm:prSet presAssocID="{6C30B1F0-A681-4A70-A6F8-00657A10747A}" presName="background" presStyleLbl="node0" presStyleIdx="2" presStyleCnt="4"/>
+      <dgm:prSet presAssocID="{6C30B1F0-A681-4A70-A6F8-00657A10747A}" presName="background" presStyleLbl="node0" presStyleIdx="3" presStyleCnt="4"/>
       <dgm:spPr/>
     </dgm:pt>
     <dgm:pt modelId="{49D4FDDE-A372-454F-B0A1-04381E09C6CE}" type="pres">
-      <dgm:prSet presAssocID="{6C30B1F0-A681-4A70-A6F8-00657A10747A}" presName="text" presStyleLbl="fgAcc0" presStyleIdx="2" presStyleCnt="4">
+      <dgm:prSet presAssocID="{6C30B1F0-A681-4A70-A6F8-00657A10747A}" presName="text" presStyleLbl="fgAcc0" presStyleIdx="3" presStyleCnt="4">
         <dgm:presLayoutVars>
           <dgm:chPref val="3"/>
         </dgm:presLayoutVars>
@@ -5751,61 +5945,37 @@
       <dgm:prSet presAssocID="{6C30B1F0-A681-4A70-A6F8-00657A10747A}" presName="hierChild2" presStyleCnt="0"/>
       <dgm:spPr/>
     </dgm:pt>
-    <dgm:pt modelId="{F60B5E69-5795-4AA8-A6B1-9E5063BCDB52}" type="pres">
-      <dgm:prSet presAssocID="{9A95E03E-DC01-4B1B-A778-987E552C4A37}" presName="hierRoot1" presStyleCnt="0"/>
-      <dgm:spPr/>
-    </dgm:pt>
-    <dgm:pt modelId="{68B8E39B-0792-40BA-A740-6E9DA83CC650}" type="pres">
-      <dgm:prSet presAssocID="{9A95E03E-DC01-4B1B-A778-987E552C4A37}" presName="composite" presStyleCnt="0"/>
-      <dgm:spPr/>
-    </dgm:pt>
-    <dgm:pt modelId="{2B16FC6A-3383-4265-B565-CE52B1A983C1}" type="pres">
-      <dgm:prSet presAssocID="{9A95E03E-DC01-4B1B-A778-987E552C4A37}" presName="background" presStyleLbl="node0" presStyleIdx="3" presStyleCnt="4"/>
-      <dgm:spPr/>
-    </dgm:pt>
-    <dgm:pt modelId="{2097F72E-D9D0-4B61-91A3-C99B30BE14F7}" type="pres">
-      <dgm:prSet presAssocID="{9A95E03E-DC01-4B1B-A778-987E552C4A37}" presName="text" presStyleLbl="fgAcc0" presStyleIdx="3" presStyleCnt="4">
-        <dgm:presLayoutVars>
-          <dgm:chPref val="3"/>
-        </dgm:presLayoutVars>
-      </dgm:prSet>
-      <dgm:spPr/>
-    </dgm:pt>
-    <dgm:pt modelId="{1751C7C6-5914-4AE8-9EE6-08EF8C51F4DA}" type="pres">
-      <dgm:prSet presAssocID="{9A95E03E-DC01-4B1B-A778-987E552C4A37}" presName="hierChild2" presStyleCnt="0"/>
-      <dgm:spPr/>
-    </dgm:pt>
   </dgm:ptLst>
   <dgm:cxnLst>
     <dgm:cxn modelId="{3B399211-8AB1-4658-AF00-8F8667C815DB}" srcId="{803F9C41-0B7C-46D5-A84A-51E688A3D601}" destId="{C4698E69-17CF-4858-B15F-B6028C352A2D}" srcOrd="1" destOrd="0" parTransId="{113C0813-F207-4909-ADB5-AD4CDD65DCD4}" sibTransId="{12E58754-C7A1-4407-8554-5FD1270AEEF3}"/>
-    <dgm:cxn modelId="{D7F3A021-0058-42BF-ADEF-555453320E0A}" type="presOf" srcId="{C4698E69-17CF-4858-B15F-B6028C352A2D}" destId="{BA862F6B-170A-4E57-8233-5BE4F9905BCB}" srcOrd="0" destOrd="0" presId="urn:microsoft.com/office/officeart/2005/8/layout/hierarchy1"/>
     <dgm:cxn modelId="{1B69592C-B706-4F02-9FD2-8C7E3BB48CB4}" srcId="{803F9C41-0B7C-46D5-A84A-51E688A3D601}" destId="{0D2E4E2E-25B5-4D4E-A9F7-956137CB4B16}" srcOrd="0" destOrd="0" parTransId="{7B80C90D-AC2E-4BFD-8489-32E96BCEB3E8}" sibTransId="{E0610B52-3D9F-436A-809A-6B74703EEE32}"/>
+    <dgm:cxn modelId="{E528816A-BC48-4C51-A874-B29F393F83E1}" type="presOf" srcId="{C4698E69-17CF-4858-B15F-B6028C352A2D}" destId="{BA862F6B-170A-4E57-8233-5BE4F9905BCB}" srcOrd="0" destOrd="0" presId="urn:microsoft.com/office/officeart/2005/8/layout/hierarchy1"/>
     <dgm:cxn modelId="{271CBC4B-81C9-4BAE-A558-76C49AAA23D6}" type="presOf" srcId="{803F9C41-0B7C-46D5-A84A-51E688A3D601}" destId="{665A7224-D66A-45F7-ADCF-B121A06EB3AB}" srcOrd="0" destOrd="0" presId="urn:microsoft.com/office/officeart/2005/8/layout/hierarchy1"/>
-    <dgm:cxn modelId="{99DE5B53-3158-4A89-B387-AD209C3E9D96}" srcId="{803F9C41-0B7C-46D5-A84A-51E688A3D601}" destId="{6C30B1F0-A681-4A70-A6F8-00657A10747A}" srcOrd="2" destOrd="0" parTransId="{D1E94301-3270-44A7-BAA3-FB8323867ED3}" sibTransId="{0D683FBA-3A0F-4045-B92E-A93D82450B87}"/>
-    <dgm:cxn modelId="{2C1A4084-B813-4A28-9884-8B255D1224EF}" type="presOf" srcId="{9A95E03E-DC01-4B1B-A778-987E552C4A37}" destId="{2097F72E-D9D0-4B61-91A3-C99B30BE14F7}" srcOrd="0" destOrd="0" presId="urn:microsoft.com/office/officeart/2005/8/layout/hierarchy1"/>
-    <dgm:cxn modelId="{1D978B96-FD91-45C9-A809-FA7D5D7242F4}" type="presOf" srcId="{0D2E4E2E-25B5-4D4E-A9F7-956137CB4B16}" destId="{2E0DEFD8-165E-470D-9BD4-7E3610D974D9}" srcOrd="0" destOrd="0" presId="urn:microsoft.com/office/officeart/2005/8/layout/hierarchy1"/>
-    <dgm:cxn modelId="{CC9EA6EF-7647-4CE6-B57E-1B20AFE0DD08}" type="presOf" srcId="{6C30B1F0-A681-4A70-A6F8-00657A10747A}" destId="{49D4FDDE-A372-454F-B0A1-04381E09C6CE}" srcOrd="0" destOrd="0" presId="urn:microsoft.com/office/officeart/2005/8/layout/hierarchy1"/>
-    <dgm:cxn modelId="{F00199F2-C0E4-449C-8056-5BA195A3BE22}" srcId="{803F9C41-0B7C-46D5-A84A-51E688A3D601}" destId="{9A95E03E-DC01-4B1B-A778-987E552C4A37}" srcOrd="3" destOrd="0" parTransId="{83A844AE-4F36-443B-A0D5-791049FB10C1}" sibTransId="{49871633-9C95-4A64-ABD2-BEE24AF8C735}"/>
-    <dgm:cxn modelId="{27568764-E37E-442E-9421-E78852B5A64D}" type="presParOf" srcId="{665A7224-D66A-45F7-ADCF-B121A06EB3AB}" destId="{8938048F-8CE6-4E77-BA83-CC172148D889}" srcOrd="0" destOrd="0" presId="urn:microsoft.com/office/officeart/2005/8/layout/hierarchy1"/>
-    <dgm:cxn modelId="{CE371965-82BE-42A7-933E-73F0DF41AAED}" type="presParOf" srcId="{8938048F-8CE6-4E77-BA83-CC172148D889}" destId="{C5041EBF-9FE1-48AD-9135-E1F048DA3680}" srcOrd="0" destOrd="0" presId="urn:microsoft.com/office/officeart/2005/8/layout/hierarchy1"/>
-    <dgm:cxn modelId="{9A3E4B02-635F-4727-8668-5A76D9580730}" type="presParOf" srcId="{C5041EBF-9FE1-48AD-9135-E1F048DA3680}" destId="{8219765C-8A42-4132-A060-9C8C72D1E00A}" srcOrd="0" destOrd="0" presId="urn:microsoft.com/office/officeart/2005/8/layout/hierarchy1"/>
-    <dgm:cxn modelId="{C084BD38-7B20-45EB-90FE-17A794599741}" type="presParOf" srcId="{C5041EBF-9FE1-48AD-9135-E1F048DA3680}" destId="{2E0DEFD8-165E-470D-9BD4-7E3610D974D9}" srcOrd="1" destOrd="0" presId="urn:microsoft.com/office/officeart/2005/8/layout/hierarchy1"/>
-    <dgm:cxn modelId="{3AF6DCA9-6593-4E9D-A81E-2FDE39FFFABA}" type="presParOf" srcId="{8938048F-8CE6-4E77-BA83-CC172148D889}" destId="{D7676F09-C35C-47F9-8346-AE8B95B250BC}" srcOrd="1" destOrd="0" presId="urn:microsoft.com/office/officeart/2005/8/layout/hierarchy1"/>
-    <dgm:cxn modelId="{0D26A251-9162-4167-945F-475CBB8C8B99}" type="presParOf" srcId="{665A7224-D66A-45F7-ADCF-B121A06EB3AB}" destId="{7E252FDA-8A84-4AF9-BF84-CD1F0B0F827D}" srcOrd="1" destOrd="0" presId="urn:microsoft.com/office/officeart/2005/8/layout/hierarchy1"/>
-    <dgm:cxn modelId="{653ED488-F7CD-4C6F-ACF9-5A165A1DA543}" type="presParOf" srcId="{7E252FDA-8A84-4AF9-BF84-CD1F0B0F827D}" destId="{29DCDA3F-2D81-41CE-9D8B-5B033FF65CBC}" srcOrd="0" destOrd="0" presId="urn:microsoft.com/office/officeart/2005/8/layout/hierarchy1"/>
-    <dgm:cxn modelId="{434E276A-86BC-4C52-AC7E-D2B2D3A27DAA}" type="presParOf" srcId="{29DCDA3F-2D81-41CE-9D8B-5B033FF65CBC}" destId="{630871FA-6A53-44AE-B752-918DA73742AE}" srcOrd="0" destOrd="0" presId="urn:microsoft.com/office/officeart/2005/8/layout/hierarchy1"/>
-    <dgm:cxn modelId="{FF0D7C9B-BC09-4891-9455-2A456C8D528B}" type="presParOf" srcId="{29DCDA3F-2D81-41CE-9D8B-5B033FF65CBC}" destId="{BA862F6B-170A-4E57-8233-5BE4F9905BCB}" srcOrd="1" destOrd="0" presId="urn:microsoft.com/office/officeart/2005/8/layout/hierarchy1"/>
-    <dgm:cxn modelId="{74D43A6F-9CCA-43D0-B6A3-A0C622F24BD6}" type="presParOf" srcId="{7E252FDA-8A84-4AF9-BF84-CD1F0B0F827D}" destId="{9E47F350-F8C8-4D57-BF22-8177D1A23E1C}" srcOrd="1" destOrd="0" presId="urn:microsoft.com/office/officeart/2005/8/layout/hierarchy1"/>
-    <dgm:cxn modelId="{40FE790B-AECA-4AC3-AAE8-BE6EB5FFC8E1}" type="presParOf" srcId="{665A7224-D66A-45F7-ADCF-B121A06EB3AB}" destId="{D8B4281E-F199-4868-8408-9067B2DECB4E}" srcOrd="2" destOrd="0" presId="urn:microsoft.com/office/officeart/2005/8/layout/hierarchy1"/>
-    <dgm:cxn modelId="{7A13B7E3-2C7D-4C0F-8A73-62BD4EE2FDA1}" type="presParOf" srcId="{D8B4281E-F199-4868-8408-9067B2DECB4E}" destId="{A8564459-9EFC-4DB4-905A-6C492AEB54EB}" srcOrd="0" destOrd="0" presId="urn:microsoft.com/office/officeart/2005/8/layout/hierarchy1"/>
-    <dgm:cxn modelId="{5A489B22-DF68-4252-9888-3D95317854FE}" type="presParOf" srcId="{A8564459-9EFC-4DB4-905A-6C492AEB54EB}" destId="{0C161332-3E82-4DD7-B9E2-603B911773F0}" srcOrd="0" destOrd="0" presId="urn:microsoft.com/office/officeart/2005/8/layout/hierarchy1"/>
-    <dgm:cxn modelId="{40E2C468-A32E-412A-9AC5-74C005AFACD5}" type="presParOf" srcId="{A8564459-9EFC-4DB4-905A-6C492AEB54EB}" destId="{49D4FDDE-A372-454F-B0A1-04381E09C6CE}" srcOrd="1" destOrd="0" presId="urn:microsoft.com/office/officeart/2005/8/layout/hierarchy1"/>
-    <dgm:cxn modelId="{1A2DF042-038B-4446-95C7-09735EB78DBF}" type="presParOf" srcId="{D8B4281E-F199-4868-8408-9067B2DECB4E}" destId="{0EAD1C06-B919-4B8C-BBC3-597B1E8C1383}" srcOrd="1" destOrd="0" presId="urn:microsoft.com/office/officeart/2005/8/layout/hierarchy1"/>
-    <dgm:cxn modelId="{349FCB51-F491-4E1B-B62D-B414C38BAC5B}" type="presParOf" srcId="{665A7224-D66A-45F7-ADCF-B121A06EB3AB}" destId="{F60B5E69-5795-4AA8-A6B1-9E5063BCDB52}" srcOrd="3" destOrd="0" presId="urn:microsoft.com/office/officeart/2005/8/layout/hierarchy1"/>
-    <dgm:cxn modelId="{5171BD0B-4638-4EAD-9DD1-2B68F25C8269}" type="presParOf" srcId="{F60B5E69-5795-4AA8-A6B1-9E5063BCDB52}" destId="{68B8E39B-0792-40BA-A740-6E9DA83CC650}" srcOrd="0" destOrd="0" presId="urn:microsoft.com/office/officeart/2005/8/layout/hierarchy1"/>
-    <dgm:cxn modelId="{E4ED3602-B6AD-4A17-85A6-81072DD01F01}" type="presParOf" srcId="{68B8E39B-0792-40BA-A740-6E9DA83CC650}" destId="{2B16FC6A-3383-4265-B565-CE52B1A983C1}" srcOrd="0" destOrd="0" presId="urn:microsoft.com/office/officeart/2005/8/layout/hierarchy1"/>
-    <dgm:cxn modelId="{7C591E33-BDF2-4D0C-B35D-D83AC0CBDEDC}" type="presParOf" srcId="{68B8E39B-0792-40BA-A740-6E9DA83CC650}" destId="{2097F72E-D9D0-4B61-91A3-C99B30BE14F7}" srcOrd="1" destOrd="0" presId="urn:microsoft.com/office/officeart/2005/8/layout/hierarchy1"/>
-    <dgm:cxn modelId="{37B64807-0A55-4B87-BA53-CAAA8BB9AA05}" type="presParOf" srcId="{F60B5E69-5795-4AA8-A6B1-9E5063BCDB52}" destId="{1751C7C6-5914-4AE8-9EE6-08EF8C51F4DA}" srcOrd="1" destOrd="0" presId="urn:microsoft.com/office/officeart/2005/8/layout/hierarchy1"/>
+    <dgm:cxn modelId="{35FFA970-E9CB-43AA-8833-FE9594640E58}" type="presOf" srcId="{0D2E4E2E-25B5-4D4E-A9F7-956137CB4B16}" destId="{2E0DEFD8-165E-470D-9BD4-7E3610D974D9}" srcOrd="0" destOrd="0" presId="urn:microsoft.com/office/officeart/2005/8/layout/hierarchy1"/>
+    <dgm:cxn modelId="{34C13353-A7E8-4F7B-947F-1DB14830948A}" type="presOf" srcId="{6C30B1F0-A681-4A70-A6F8-00657A10747A}" destId="{49D4FDDE-A372-454F-B0A1-04381E09C6CE}" srcOrd="0" destOrd="0" presId="urn:microsoft.com/office/officeart/2005/8/layout/hierarchy1"/>
+    <dgm:cxn modelId="{99DE5B53-3158-4A89-B387-AD209C3E9D96}" srcId="{803F9C41-0B7C-46D5-A84A-51E688A3D601}" destId="{6C30B1F0-A681-4A70-A6F8-00657A10747A}" srcOrd="3" destOrd="0" parTransId="{D1E94301-3270-44A7-BAA3-FB8323867ED3}" sibTransId="{0D683FBA-3A0F-4045-B92E-A93D82450B87}"/>
+    <dgm:cxn modelId="{405E497E-61E3-4FB8-A2A1-2FE842274476}" type="presOf" srcId="{21FD537B-64B1-480D-8097-9ED46EA0F852}" destId="{3B264F07-3314-4445-BE95-79F6325640B9}" srcOrd="0" destOrd="0" presId="urn:microsoft.com/office/officeart/2005/8/layout/hierarchy1"/>
+    <dgm:cxn modelId="{16937194-3172-4521-9B96-E0AB75DC8CEE}" srcId="{803F9C41-0B7C-46D5-A84A-51E688A3D601}" destId="{21FD537B-64B1-480D-8097-9ED46EA0F852}" srcOrd="2" destOrd="0" parTransId="{55232BC7-9D25-4340-8A46-DEB64294B476}" sibTransId="{60A3A506-9D37-4933-8161-823955E3C611}"/>
+    <dgm:cxn modelId="{F2F3D770-6810-4FF0-B763-89EF7168837B}" type="presParOf" srcId="{665A7224-D66A-45F7-ADCF-B121A06EB3AB}" destId="{8938048F-8CE6-4E77-BA83-CC172148D889}" srcOrd="0" destOrd="0" presId="urn:microsoft.com/office/officeart/2005/8/layout/hierarchy1"/>
+    <dgm:cxn modelId="{D41C4AD5-4E7F-4511-A426-DBB94351BE4D}" type="presParOf" srcId="{8938048F-8CE6-4E77-BA83-CC172148D889}" destId="{C5041EBF-9FE1-48AD-9135-E1F048DA3680}" srcOrd="0" destOrd="0" presId="urn:microsoft.com/office/officeart/2005/8/layout/hierarchy1"/>
+    <dgm:cxn modelId="{7488CCA9-5523-455E-8E64-894A8FC987D2}" type="presParOf" srcId="{C5041EBF-9FE1-48AD-9135-E1F048DA3680}" destId="{8219765C-8A42-4132-A060-9C8C72D1E00A}" srcOrd="0" destOrd="0" presId="urn:microsoft.com/office/officeart/2005/8/layout/hierarchy1"/>
+    <dgm:cxn modelId="{90198C37-4AD6-47D3-9714-702E490D16F4}" type="presParOf" srcId="{C5041EBF-9FE1-48AD-9135-E1F048DA3680}" destId="{2E0DEFD8-165E-470D-9BD4-7E3610D974D9}" srcOrd="1" destOrd="0" presId="urn:microsoft.com/office/officeart/2005/8/layout/hierarchy1"/>
+    <dgm:cxn modelId="{75B81038-AAA6-4124-84B0-765AB1CF2888}" type="presParOf" srcId="{8938048F-8CE6-4E77-BA83-CC172148D889}" destId="{D7676F09-C35C-47F9-8346-AE8B95B250BC}" srcOrd="1" destOrd="0" presId="urn:microsoft.com/office/officeart/2005/8/layout/hierarchy1"/>
+    <dgm:cxn modelId="{BCBA8063-BE3F-499E-B888-6B6F8960D457}" type="presParOf" srcId="{665A7224-D66A-45F7-ADCF-B121A06EB3AB}" destId="{7E252FDA-8A84-4AF9-BF84-CD1F0B0F827D}" srcOrd="1" destOrd="0" presId="urn:microsoft.com/office/officeart/2005/8/layout/hierarchy1"/>
+    <dgm:cxn modelId="{E7BD3284-82BA-4CC0-9FF6-208D93F8C7E8}" type="presParOf" srcId="{7E252FDA-8A84-4AF9-BF84-CD1F0B0F827D}" destId="{29DCDA3F-2D81-41CE-9D8B-5B033FF65CBC}" srcOrd="0" destOrd="0" presId="urn:microsoft.com/office/officeart/2005/8/layout/hierarchy1"/>
+    <dgm:cxn modelId="{F63B4D91-4624-4E3C-9614-5DEF709BD963}" type="presParOf" srcId="{29DCDA3F-2D81-41CE-9D8B-5B033FF65CBC}" destId="{630871FA-6A53-44AE-B752-918DA73742AE}" srcOrd="0" destOrd="0" presId="urn:microsoft.com/office/officeart/2005/8/layout/hierarchy1"/>
+    <dgm:cxn modelId="{BE496B20-DC5A-449A-9FA3-13AD3D2E2739}" type="presParOf" srcId="{29DCDA3F-2D81-41CE-9D8B-5B033FF65CBC}" destId="{BA862F6B-170A-4E57-8233-5BE4F9905BCB}" srcOrd="1" destOrd="0" presId="urn:microsoft.com/office/officeart/2005/8/layout/hierarchy1"/>
+    <dgm:cxn modelId="{66F31631-ED58-4BC2-B08B-029E68AC27AF}" type="presParOf" srcId="{7E252FDA-8A84-4AF9-BF84-CD1F0B0F827D}" destId="{9E47F350-F8C8-4D57-BF22-8177D1A23E1C}" srcOrd="1" destOrd="0" presId="urn:microsoft.com/office/officeart/2005/8/layout/hierarchy1"/>
+    <dgm:cxn modelId="{82B052C1-F953-46E5-91EE-3D8C4A27D7FA}" type="presParOf" srcId="{665A7224-D66A-45F7-ADCF-B121A06EB3AB}" destId="{9549A2D0-7975-4C25-BCA2-6AED093AEAA1}" srcOrd="2" destOrd="0" presId="urn:microsoft.com/office/officeart/2005/8/layout/hierarchy1"/>
+    <dgm:cxn modelId="{EE35AB8F-E97F-4DD6-85DD-15B2C5DDE20F}" type="presParOf" srcId="{9549A2D0-7975-4C25-BCA2-6AED093AEAA1}" destId="{79A734A8-9E64-4892-B7DD-62DD6A1999FD}" srcOrd="0" destOrd="0" presId="urn:microsoft.com/office/officeart/2005/8/layout/hierarchy1"/>
+    <dgm:cxn modelId="{A67CA752-92D7-4F03-8C4B-FAE8F223C506}" type="presParOf" srcId="{79A734A8-9E64-4892-B7DD-62DD6A1999FD}" destId="{23DBA986-D6A4-459F-927C-6C8164FF1B1C}" srcOrd="0" destOrd="0" presId="urn:microsoft.com/office/officeart/2005/8/layout/hierarchy1"/>
+    <dgm:cxn modelId="{743CE299-C431-4ED0-9FE8-0C4A5B776E37}" type="presParOf" srcId="{79A734A8-9E64-4892-B7DD-62DD6A1999FD}" destId="{3B264F07-3314-4445-BE95-79F6325640B9}" srcOrd="1" destOrd="0" presId="urn:microsoft.com/office/officeart/2005/8/layout/hierarchy1"/>
+    <dgm:cxn modelId="{7E473135-931C-4213-BC01-33B40A55E7BD}" type="presParOf" srcId="{9549A2D0-7975-4C25-BCA2-6AED093AEAA1}" destId="{297E22DE-B0A9-44D6-A316-A6B304F62F28}" srcOrd="1" destOrd="0" presId="urn:microsoft.com/office/officeart/2005/8/layout/hierarchy1"/>
+    <dgm:cxn modelId="{9A4E6487-DF15-4D78-9D16-561761E2ED1A}" type="presParOf" srcId="{665A7224-D66A-45F7-ADCF-B121A06EB3AB}" destId="{D8B4281E-F199-4868-8408-9067B2DECB4E}" srcOrd="3" destOrd="0" presId="urn:microsoft.com/office/officeart/2005/8/layout/hierarchy1"/>
+    <dgm:cxn modelId="{4D4C8B9A-0C50-463E-BBBC-1640E54B1190}" type="presParOf" srcId="{D8B4281E-F199-4868-8408-9067B2DECB4E}" destId="{A8564459-9EFC-4DB4-905A-6C492AEB54EB}" srcOrd="0" destOrd="0" presId="urn:microsoft.com/office/officeart/2005/8/layout/hierarchy1"/>
+    <dgm:cxn modelId="{6056CCCE-B8ED-4B8F-B8B7-9FAB2AFD81B4}" type="presParOf" srcId="{A8564459-9EFC-4DB4-905A-6C492AEB54EB}" destId="{0C161332-3E82-4DD7-B9E2-603B911773F0}" srcOrd="0" destOrd="0" presId="urn:microsoft.com/office/officeart/2005/8/layout/hierarchy1"/>
+    <dgm:cxn modelId="{1A27AE5E-001A-4A66-87D1-3EE8882A58AB}" type="presParOf" srcId="{A8564459-9EFC-4DB4-905A-6C492AEB54EB}" destId="{49D4FDDE-A372-454F-B0A1-04381E09C6CE}" srcOrd="1" destOrd="0" presId="urn:microsoft.com/office/officeart/2005/8/layout/hierarchy1"/>
+    <dgm:cxn modelId="{1E0E0CA5-2B45-43EF-858B-D1B68ED18AAC}" type="presParOf" srcId="{D8B4281E-F199-4868-8408-9067B2DECB4E}" destId="{0EAD1C06-B919-4B8C-BBC3-597B1E8C1383}" srcOrd="1" destOrd="0" presId="urn:microsoft.com/office/officeart/2005/8/layout/hierarchy1"/>
   </dgm:cxnLst>
   <dgm:bg/>
   <dgm:whole/>
@@ -6169,7 +6339,11 @@
             <a:buNone/>
           </a:pPr>
           <a:r>
-            <a:rPr lang="en-US" sz="2600" kern="1200"/>
+            <a:rPr lang="en-US" sz="2600" kern="1200" dirty="0">
+              <a:latin typeface="Franklin Gothic Medium"/>
+              <a:ea typeface="+mn-ea"/>
+              <a:cs typeface="+mn-cs"/>
+            </a:rPr>
             <a:t>FR1 – Website Form Submission</a:t>
           </a:r>
         </a:p>
@@ -6277,7 +6451,11 @@
             <a:buNone/>
           </a:pPr>
           <a:r>
-            <a:rPr lang="en-US" sz="2600" kern="1200"/>
+            <a:rPr lang="en-US" sz="2600" kern="1200" dirty="0">
+              <a:latin typeface="Franklin Gothic Medium"/>
+              <a:ea typeface="+mn-ea"/>
+              <a:cs typeface="+mn-cs"/>
+            </a:rPr>
             <a:t>FR2 – Submission Handling in Backend</a:t>
           </a:r>
         </a:p>
@@ -6385,7 +6563,11 @@
             <a:buNone/>
           </a:pPr>
           <a:r>
-            <a:rPr lang="en-US" sz="2600" kern="1200"/>
+            <a:rPr lang="en-US" sz="2600" kern="1200" dirty="0">
+              <a:latin typeface="Franklin Gothic Medium"/>
+              <a:ea typeface="+mn-ea"/>
+              <a:cs typeface="+mn-cs"/>
+            </a:rPr>
             <a:t>FR5 – Live Order Queue</a:t>
           </a:r>
         </a:p>
@@ -6493,7 +6675,11 @@
             <a:buNone/>
           </a:pPr>
           <a:r>
-            <a:rPr lang="en-US" sz="2600" kern="1200"/>
+            <a:rPr lang="en-US" sz="2600" kern="1200" dirty="0">
+              <a:latin typeface="Franklin Gothic Medium"/>
+              <a:ea typeface="+mn-ea"/>
+              <a:cs typeface="+mn-cs"/>
+            </a:rPr>
             <a:t>NFR3 – Cart list</a:t>
           </a:r>
         </a:p>
@@ -6601,7 +6787,11 @@
             <a:buNone/>
           </a:pPr>
           <a:r>
-            <a:rPr lang="en-US" sz="2600" kern="1200"/>
+            <a:rPr lang="en-US" sz="2600" kern="1200" dirty="0">
+              <a:latin typeface="Franklin Gothic Medium"/>
+              <a:ea typeface="+mn-ea"/>
+              <a:cs typeface="+mn-cs"/>
+            </a:rPr>
             <a:t>NFR4 – Order Confirmation</a:t>
           </a:r>
         </a:p>
@@ -6757,7 +6947,7 @@
         </a:bodyPr>
         <a:lstStyle/>
         <a:p>
-          <a:pPr marL="0" lvl="0" indent="0" algn="ctr" defTabSz="577850">
+          <a:pPr marL="0" lvl="0" indent="0" algn="ctr" defTabSz="577850" rtl="0">
             <a:lnSpc>
               <a:spcPct val="100000"/>
             </a:lnSpc>
@@ -6771,9 +6961,22 @@
             <a:defRPr cap="all"/>
           </a:pPr>
           <a:r>
-            <a:rPr lang="en-US" sz="1300" kern="1200"/>
-            <a:t>Requirement work assignment</a:t>
+            <a:rPr lang="en-US" sz="1300" kern="1200" dirty="0">
+              <a:latin typeface="Franklin Gothic Demi Cond" panose="020B0706030402020204"/>
+            </a:rPr>
+            <a:t>Assign work</a:t>
           </a:r>
+          <a:r>
+            <a:rPr lang="en-US" sz="1300" kern="1200" dirty="0"/>
+            <a:t> </a:t>
+          </a:r>
+          <a:r>
+            <a:rPr lang="en-US" sz="1300" kern="1200" dirty="0">
+              <a:latin typeface="Franklin Gothic Demi Cond" panose="020B0706030402020204"/>
+            </a:rPr>
+            <a:t>to team</a:t>
+          </a:r>
+          <a:endParaRPr lang="en-US" sz="1300" kern="1200" dirty="0"/>
         </a:p>
       </dsp:txBody>
       <dsp:txXfrm>
@@ -6929,7 +7132,7 @@
             <a:defRPr cap="all"/>
           </a:pPr>
           <a:r>
-            <a:rPr lang="en-US" sz="1300" kern="1200"/>
+            <a:rPr lang="en-US" sz="1300" kern="1200" dirty="0"/>
             <a:t>Design WebApp UI</a:t>
           </a:r>
         </a:p>
@@ -7087,7 +7290,7 @@
             <a:defRPr cap="all"/>
           </a:pPr>
           <a:r>
-            <a:rPr lang="en-US" sz="1300" kern="1200"/>
+            <a:rPr lang="en-US" sz="1300" kern="1200" dirty="0"/>
             <a:t>Develop the backend order handling</a:t>
           </a:r>
         </a:p>
@@ -7245,7 +7448,7 @@
             <a:defRPr cap="all"/>
           </a:pPr>
           <a:r>
-            <a:rPr lang="en-US" sz="1300" kern="1200"/>
+            <a:rPr lang="en-US" sz="1300" kern="1200" dirty="0"/>
             <a:t>Ensure Client Requests Reach Backend</a:t>
           </a:r>
         </a:p>
@@ -7403,7 +7606,7 @@
             <a:defRPr cap="all"/>
           </a:pPr>
           <a:r>
-            <a:rPr lang="en-US" sz="1300" kern="1200"/>
+            <a:rPr lang="en-US" sz="1300" kern="1200" dirty="0"/>
             <a:t>Testing and bug-fixing</a:t>
           </a:r>
         </a:p>
@@ -7561,7 +7764,7 @@
             <a:defRPr cap="all"/>
           </a:pPr>
           <a:r>
-            <a:rPr lang="en-US" sz="1300" kern="1200"/>
+            <a:rPr lang="en-US" sz="1300" kern="1200" dirty="0"/>
             <a:t>Release</a:t>
           </a:r>
         </a:p>
@@ -7590,8 +7793,8 @@
       </dsp:nvSpPr>
       <dsp:spPr>
         <a:xfrm>
-          <a:off x="3008" y="1001437"/>
-          <a:ext cx="2148005" cy="1363983"/>
+          <a:off x="3491" y="1149482"/>
+          <a:ext cx="2492713" cy="1582873"/>
         </a:xfrm>
         <a:prstGeom prst="roundRect">
           <a:avLst>
@@ -7642,8 +7845,8 @@
       </dsp:nvSpPr>
       <dsp:spPr>
         <a:xfrm>
-          <a:off x="241675" y="1228171"/>
-          <a:ext cx="2148005" cy="1363983"/>
+          <a:off x="280459" y="1412601"/>
+          <a:ext cx="2492713" cy="1582873"/>
         </a:xfrm>
         <a:prstGeom prst="roundRect">
           <a:avLst>
@@ -7686,12 +7889,12 @@
         <a:fontRef idx="minor"/>
       </dsp:style>
       <dsp:txBody>
-        <a:bodyPr spcFirstLastPara="0" vert="horz" wrap="square" lIns="76200" tIns="76200" rIns="76200" bIns="76200" numCol="1" spcCol="1270" anchor="ctr" anchorCtr="0">
+        <a:bodyPr spcFirstLastPara="0" vert="horz" wrap="square" lIns="87630" tIns="87630" rIns="87630" bIns="87630" numCol="1" spcCol="1270" anchor="ctr" anchorCtr="0">
           <a:noAutofit/>
         </a:bodyPr>
         <a:lstStyle/>
         <a:p>
-          <a:pPr marL="0" lvl="0" indent="0" algn="ctr" defTabSz="889000">
+          <a:pPr marL="0" lvl="0" indent="0" algn="ctr" defTabSz="1022350">
             <a:lnSpc>
               <a:spcPct val="90000"/>
             </a:lnSpc>
@@ -7704,15 +7907,23 @@
             <a:buNone/>
           </a:pPr>
           <a:r>
-            <a:rPr lang="en-US" sz="2000" kern="1200" baseline="0"/>
+            <a:rPr lang="en-US" sz="2300" kern="1200" baseline="0" dirty="0">
+              <a:latin typeface="Franklin Gothic Medium" panose="020B0603020102020204"/>
+              <a:ea typeface="+mn-ea"/>
+              <a:cs typeface="+mn-cs"/>
+            </a:rPr>
             <a:t>Sean Staley – Project Manager / Frontend Engineer</a:t>
           </a:r>
-          <a:endParaRPr lang="en-US" sz="2000" kern="1200"/>
+          <a:endParaRPr lang="en-US" sz="2300" kern="1200" dirty="0">
+            <a:latin typeface="Franklin Gothic Medium" panose="020B0603020102020204"/>
+            <a:ea typeface="+mn-ea"/>
+            <a:cs typeface="+mn-cs"/>
+          </a:endParaRPr>
         </a:p>
       </dsp:txBody>
       <dsp:txXfrm>
-        <a:off x="281625" y="1268121"/>
-        <a:ext cx="2068105" cy="1284083"/>
+        <a:off x="326820" y="1458962"/>
+        <a:ext cx="2399991" cy="1490151"/>
       </dsp:txXfrm>
     </dsp:sp>
     <dsp:sp modelId="{630871FA-6A53-44AE-B752-918DA73742AE}">
@@ -7722,8 +7933,8 @@
       </dsp:nvSpPr>
       <dsp:spPr>
         <a:xfrm>
-          <a:off x="2628349" y="1001437"/>
-          <a:ext cx="2148005" cy="1363983"/>
+          <a:off x="3050141" y="1149482"/>
+          <a:ext cx="2492713" cy="1582873"/>
         </a:xfrm>
         <a:prstGeom prst="roundRect">
           <a:avLst>
@@ -7774,8 +7985,8 @@
       </dsp:nvSpPr>
       <dsp:spPr>
         <a:xfrm>
-          <a:off x="2867016" y="1228171"/>
-          <a:ext cx="2148005" cy="1363983"/>
+          <a:off x="3327109" y="1412601"/>
+          <a:ext cx="2492713" cy="1582873"/>
         </a:xfrm>
         <a:prstGeom prst="roundRect">
           <a:avLst>
@@ -7818,12 +8029,12 @@
         <a:fontRef idx="minor"/>
       </dsp:style>
       <dsp:txBody>
-        <a:bodyPr spcFirstLastPara="0" vert="horz" wrap="square" lIns="76200" tIns="76200" rIns="76200" bIns="76200" numCol="1" spcCol="1270" anchor="ctr" anchorCtr="0">
+        <a:bodyPr spcFirstLastPara="0" vert="horz" wrap="square" lIns="87630" tIns="87630" rIns="87630" bIns="87630" numCol="1" spcCol="1270" anchor="ctr" anchorCtr="0">
           <a:noAutofit/>
         </a:bodyPr>
         <a:lstStyle/>
         <a:p>
-          <a:pPr marL="0" lvl="0" indent="0" algn="ctr" defTabSz="889000">
+          <a:pPr marL="0" lvl="0" indent="0" algn="ctr" defTabSz="1022350">
             <a:lnSpc>
               <a:spcPct val="90000"/>
             </a:lnSpc>
@@ -7836,15 +8047,163 @@
             <a:buNone/>
           </a:pPr>
           <a:r>
-            <a:rPr lang="en-US" sz="2000" kern="1200" baseline="0" dirty="0"/>
+            <a:rPr lang="en-US" sz="2300" kern="1200" baseline="0" dirty="0">
+              <a:latin typeface="Franklin Gothic Medium" panose="020B0603020102020204"/>
+              <a:ea typeface="+mn-ea"/>
+              <a:cs typeface="+mn-cs"/>
+            </a:rPr>
             <a:t>Jaden Wattley – Backend Engineer / Product Engineer</a:t>
           </a:r>
-          <a:endParaRPr lang="en-US" sz="2000" kern="1200" dirty="0"/>
+          <a:endParaRPr lang="en-US" sz="2300" kern="1200" dirty="0">
+            <a:latin typeface="Franklin Gothic Medium" panose="020B0603020102020204"/>
+            <a:ea typeface="+mn-ea"/>
+            <a:cs typeface="+mn-cs"/>
+          </a:endParaRPr>
         </a:p>
       </dsp:txBody>
       <dsp:txXfrm>
-        <a:off x="2906966" y="1268121"/>
-        <a:ext cx="2068105" cy="1284083"/>
+        <a:off x="3373470" y="1458962"/>
+        <a:ext cx="2399991" cy="1490151"/>
+      </dsp:txXfrm>
+    </dsp:sp>
+    <dsp:sp modelId="{23DBA986-D6A4-459F-927C-6C8164FF1B1C}">
+      <dsp:nvSpPr>
+        <dsp:cNvPr id="0" name=""/>
+        <dsp:cNvSpPr/>
+      </dsp:nvSpPr>
+      <dsp:spPr>
+        <a:xfrm>
+          <a:off x="6096791" y="1149482"/>
+          <a:ext cx="2492713" cy="1582873"/>
+        </a:xfrm>
+        <a:prstGeom prst="roundRect">
+          <a:avLst>
+            <a:gd name="adj" fmla="val 10000"/>
+          </a:avLst>
+        </a:prstGeom>
+        <a:solidFill>
+          <a:schemeClr val="accent4">
+            <a:hueOff val="0"/>
+            <a:satOff val="0"/>
+            <a:lumOff val="0"/>
+            <a:alphaOff val="0"/>
+          </a:schemeClr>
+        </a:solidFill>
+        <a:ln w="19050" cap="flat" cmpd="sng" algn="ctr">
+          <a:solidFill>
+            <a:schemeClr val="lt1">
+              <a:hueOff val="0"/>
+              <a:satOff val="0"/>
+              <a:lumOff val="0"/>
+              <a:alphaOff val="0"/>
+            </a:schemeClr>
+          </a:solidFill>
+          <a:prstDash val="solid"/>
+          <a:miter lim="800000"/>
+        </a:ln>
+        <a:effectLst/>
+      </dsp:spPr>
+      <dsp:style>
+        <a:lnRef idx="3">
+          <a:scrgbClr r="0" g="0" b="0"/>
+        </a:lnRef>
+        <a:fillRef idx="1">
+          <a:scrgbClr r="0" g="0" b="0"/>
+        </a:fillRef>
+        <a:effectRef idx="1">
+          <a:scrgbClr r="0" g="0" b="0"/>
+        </a:effectRef>
+        <a:fontRef idx="minor">
+          <a:schemeClr val="lt1"/>
+        </a:fontRef>
+      </dsp:style>
+    </dsp:sp>
+    <dsp:sp modelId="{3B264F07-3314-4445-BE95-79F6325640B9}">
+      <dsp:nvSpPr>
+        <dsp:cNvPr id="0" name=""/>
+        <dsp:cNvSpPr/>
+      </dsp:nvSpPr>
+      <dsp:spPr>
+        <a:xfrm>
+          <a:off x="6373759" y="1412601"/>
+          <a:ext cx="2492713" cy="1582873"/>
+        </a:xfrm>
+        <a:prstGeom prst="roundRect">
+          <a:avLst>
+            <a:gd name="adj" fmla="val 10000"/>
+          </a:avLst>
+        </a:prstGeom>
+        <a:solidFill>
+          <a:schemeClr val="lt1">
+            <a:alpha val="90000"/>
+            <a:hueOff val="0"/>
+            <a:satOff val="0"/>
+            <a:lumOff val="0"/>
+            <a:alphaOff val="0"/>
+          </a:schemeClr>
+        </a:solidFill>
+        <a:ln w="12700" cap="flat" cmpd="sng" algn="ctr">
+          <a:solidFill>
+            <a:schemeClr val="accent4">
+              <a:hueOff val="0"/>
+              <a:satOff val="0"/>
+              <a:lumOff val="0"/>
+              <a:alphaOff val="0"/>
+            </a:schemeClr>
+          </a:solidFill>
+          <a:prstDash val="solid"/>
+          <a:miter lim="800000"/>
+        </a:ln>
+        <a:effectLst/>
+      </dsp:spPr>
+      <dsp:style>
+        <a:lnRef idx="2">
+          <a:scrgbClr r="0" g="0" b="0"/>
+        </a:lnRef>
+        <a:fillRef idx="1">
+          <a:scrgbClr r="0" g="0" b="0"/>
+        </a:fillRef>
+        <a:effectRef idx="0">
+          <a:scrgbClr r="0" g="0" b="0"/>
+        </a:effectRef>
+        <a:fontRef idx="minor"/>
+      </dsp:style>
+      <dsp:txBody>
+        <a:bodyPr spcFirstLastPara="0" vert="horz" wrap="square" lIns="87630" tIns="87630" rIns="87630" bIns="87630" numCol="1" spcCol="1270" anchor="ctr" anchorCtr="0">
+          <a:noAutofit/>
+        </a:bodyPr>
+        <a:lstStyle/>
+        <a:p>
+          <a:pPr marL="0" lvl="0" indent="0" algn="ctr" defTabSz="1022350" rtl="0">
+            <a:lnSpc>
+              <a:spcPct val="90000"/>
+            </a:lnSpc>
+            <a:spcBef>
+              <a:spcPct val="0"/>
+            </a:spcBef>
+            <a:spcAft>
+              <a:spcPct val="35000"/>
+            </a:spcAft>
+            <a:buNone/>
+          </a:pPr>
+          <a:r>
+            <a:rPr lang="en-US" sz="2300" kern="1200" baseline="0" dirty="0">
+              <a:latin typeface="Franklin Gothic Medium"/>
+              <a:ea typeface="Calibri"/>
+              <a:cs typeface="Calibri"/>
+            </a:rPr>
+            <a:t>Robert Wickliffe – Full Stack Dev</a:t>
+          </a:r>
+          <a:endParaRPr lang="en-US" sz="2300" kern="1200" baseline="0" dirty="0">
+            <a:latin typeface="Franklin Gothic Medium"/>
+            <a:ea typeface="+mn-ea"/>
+            <a:cs typeface="+mn-cs"/>
+          </a:endParaRPr>
+        </a:p>
+      </dsp:txBody>
+      <dsp:txXfrm>
+        <a:off x="6420120" y="1458962"/>
+        <a:ext cx="2399991" cy="1490151"/>
       </dsp:txXfrm>
     </dsp:sp>
     <dsp:sp modelId="{0C161332-3E82-4DD7-B9E2-603B911773F0}">
@@ -7854,8 +8213,8 @@
       </dsp:nvSpPr>
       <dsp:spPr>
         <a:xfrm>
-          <a:off x="5253689" y="1001437"/>
-          <a:ext cx="2148005" cy="1363983"/>
+          <a:off x="9143441" y="1149482"/>
+          <a:ext cx="2492713" cy="1582873"/>
         </a:xfrm>
         <a:prstGeom prst="roundRect">
           <a:avLst>
@@ -7906,8 +8265,8 @@
       </dsp:nvSpPr>
       <dsp:spPr>
         <a:xfrm>
-          <a:off x="5492356" y="1228171"/>
-          <a:ext cx="2148005" cy="1363983"/>
+          <a:off x="9420409" y="1412601"/>
+          <a:ext cx="2492713" cy="1582873"/>
         </a:xfrm>
         <a:prstGeom prst="roundRect">
           <a:avLst>
@@ -7950,12 +8309,12 @@
         <a:fontRef idx="minor"/>
       </dsp:style>
       <dsp:txBody>
-        <a:bodyPr spcFirstLastPara="0" vert="horz" wrap="square" lIns="76200" tIns="76200" rIns="76200" bIns="76200" numCol="1" spcCol="1270" anchor="ctr" anchorCtr="0">
+        <a:bodyPr spcFirstLastPara="0" vert="horz" wrap="square" lIns="87630" tIns="87630" rIns="87630" bIns="87630" numCol="1" spcCol="1270" anchor="ctr" anchorCtr="0">
           <a:noAutofit/>
         </a:bodyPr>
         <a:lstStyle/>
         <a:p>
-          <a:pPr marL="0" lvl="0" indent="0" algn="ctr" defTabSz="889000">
+          <a:pPr marL="0" lvl="0" indent="0" algn="ctr" defTabSz="1022350" rtl="0">
             <a:lnSpc>
               <a:spcPct val="90000"/>
             </a:lnSpc>
@@ -7968,147 +8327,26 @@
             <a:buNone/>
           </a:pPr>
           <a:r>
-            <a:rPr lang="en-US" sz="2000" kern="1200" baseline="0" dirty="0"/>
-            <a:t>Connor Raque – None</a:t>
+            <a:rPr lang="en-US" sz="2300" kern="1200" baseline="0" dirty="0">
+              <a:latin typeface="Franklin Gothic Medium" panose="020B0603020102020204"/>
+              <a:ea typeface="+mn-ea"/>
+              <a:cs typeface="+mn-cs"/>
+            </a:rPr>
+            <a:t>Connor Raque – </a:t>
           </a:r>
-          <a:endParaRPr lang="en-US" sz="2000" kern="1200" dirty="0"/>
+          <a:r>
+            <a:rPr lang="en-US" sz="2300" b="1" kern="1200" baseline="0" dirty="0">
+              <a:latin typeface="Franklin Gothic Demi Cond" panose="020B0706030402020204"/>
+              <a:ea typeface="+mn-ea"/>
+              <a:cs typeface="+mn-cs"/>
+            </a:rPr>
+            <a:t>None</a:t>
+          </a:r>
         </a:p>
       </dsp:txBody>
       <dsp:txXfrm>
-        <a:off x="5532306" y="1268121"/>
-        <a:ext cx="2068105" cy="1284083"/>
-      </dsp:txXfrm>
-    </dsp:sp>
-    <dsp:sp modelId="{2B16FC6A-3383-4265-B565-CE52B1A983C1}">
-      <dsp:nvSpPr>
-        <dsp:cNvPr id="0" name=""/>
-        <dsp:cNvSpPr/>
-      </dsp:nvSpPr>
-      <dsp:spPr>
-        <a:xfrm>
-          <a:off x="7879030" y="1001437"/>
-          <a:ext cx="2148005" cy="1363983"/>
-        </a:xfrm>
-        <a:prstGeom prst="roundRect">
-          <a:avLst>
-            <a:gd name="adj" fmla="val 10000"/>
-          </a:avLst>
-        </a:prstGeom>
-        <a:solidFill>
-          <a:schemeClr val="accent4">
-            <a:hueOff val="0"/>
-            <a:satOff val="0"/>
-            <a:lumOff val="0"/>
-            <a:alphaOff val="0"/>
-          </a:schemeClr>
-        </a:solidFill>
-        <a:ln w="19050" cap="flat" cmpd="sng" algn="ctr">
-          <a:solidFill>
-            <a:schemeClr val="lt1">
-              <a:hueOff val="0"/>
-              <a:satOff val="0"/>
-              <a:lumOff val="0"/>
-              <a:alphaOff val="0"/>
-            </a:schemeClr>
-          </a:solidFill>
-          <a:prstDash val="solid"/>
-          <a:miter lim="800000"/>
-        </a:ln>
-        <a:effectLst/>
-      </dsp:spPr>
-      <dsp:style>
-        <a:lnRef idx="3">
-          <a:scrgbClr r="0" g="0" b="0"/>
-        </a:lnRef>
-        <a:fillRef idx="1">
-          <a:scrgbClr r="0" g="0" b="0"/>
-        </a:fillRef>
-        <a:effectRef idx="1">
-          <a:scrgbClr r="0" g="0" b="0"/>
-        </a:effectRef>
-        <a:fontRef idx="minor">
-          <a:schemeClr val="lt1"/>
-        </a:fontRef>
-      </dsp:style>
-    </dsp:sp>
-    <dsp:sp modelId="{2097F72E-D9D0-4B61-91A3-C99B30BE14F7}">
-      <dsp:nvSpPr>
-        <dsp:cNvPr id="0" name=""/>
-        <dsp:cNvSpPr/>
-      </dsp:nvSpPr>
-      <dsp:spPr>
-        <a:xfrm>
-          <a:off x="8117697" y="1228171"/>
-          <a:ext cx="2148005" cy="1363983"/>
-        </a:xfrm>
-        <a:prstGeom prst="roundRect">
-          <a:avLst>
-            <a:gd name="adj" fmla="val 10000"/>
-          </a:avLst>
-        </a:prstGeom>
-        <a:solidFill>
-          <a:schemeClr val="lt1">
-            <a:alpha val="90000"/>
-            <a:hueOff val="0"/>
-            <a:satOff val="0"/>
-            <a:lumOff val="0"/>
-            <a:alphaOff val="0"/>
-          </a:schemeClr>
-        </a:solidFill>
-        <a:ln w="12700" cap="flat" cmpd="sng" algn="ctr">
-          <a:solidFill>
-            <a:schemeClr val="accent4">
-              <a:hueOff val="0"/>
-              <a:satOff val="0"/>
-              <a:lumOff val="0"/>
-              <a:alphaOff val="0"/>
-            </a:schemeClr>
-          </a:solidFill>
-          <a:prstDash val="solid"/>
-          <a:miter lim="800000"/>
-        </a:ln>
-        <a:effectLst/>
-      </dsp:spPr>
-      <dsp:style>
-        <a:lnRef idx="2">
-          <a:scrgbClr r="0" g="0" b="0"/>
-        </a:lnRef>
-        <a:fillRef idx="1">
-          <a:scrgbClr r="0" g="0" b="0"/>
-        </a:fillRef>
-        <a:effectRef idx="0">
-          <a:scrgbClr r="0" g="0" b="0"/>
-        </a:effectRef>
-        <a:fontRef idx="minor"/>
-      </dsp:style>
-      <dsp:txBody>
-        <a:bodyPr spcFirstLastPara="0" vert="horz" wrap="square" lIns="76200" tIns="76200" rIns="76200" bIns="76200" numCol="1" spcCol="1270" anchor="ctr" anchorCtr="0">
-          <a:noAutofit/>
-        </a:bodyPr>
-        <a:lstStyle/>
-        <a:p>
-          <a:pPr marL="0" lvl="0" indent="0" algn="ctr" defTabSz="889000">
-            <a:lnSpc>
-              <a:spcPct val="90000"/>
-            </a:lnSpc>
-            <a:spcBef>
-              <a:spcPct val="0"/>
-            </a:spcBef>
-            <a:spcAft>
-              <a:spcPct val="35000"/>
-            </a:spcAft>
-            <a:buNone/>
-          </a:pPr>
-          <a:r>
-            <a:rPr lang="en-US" sz="2000" kern="1200" baseline="0" dirty="0"/>
-            <a:t>Robert Wickliffe – Full Stack Dev</a:t>
-          </a:r>
-          <a:endParaRPr lang="en-US" sz="2000" kern="1200" dirty="0"/>
-        </a:p>
-      </dsp:txBody>
-      <dsp:txXfrm>
-        <a:off x="8157647" y="1268121"/>
-        <a:ext cx="2068105" cy="1284083"/>
+        <a:off x="9466770" y="1458962"/>
+        <a:ext cx="2399991" cy="1490151"/>
       </dsp:txXfrm>
     </dsp:sp>
   </dsp:spTree>
@@ -13576,7 +13814,7 @@
             <a:fld id="{A37D6D71-8B28-4ED6-B932-04B197003D23}" type="datetimeFigureOut">
               <a:rPr lang="en-US" dirty="0"/>
               <a:pPr algn="r"/>
-              <a:t>9/15/2025</a:t>
+              <a:t>9/16/2025</a:t>
             </a:fld>
             <a:endParaRPr lang="en-US" dirty="0"/>
           </a:p>
@@ -13798,7 +14036,7 @@
             <a:fld id="{A37D6D71-8B28-4ED6-B932-04B197003D23}" type="datetimeFigureOut">
               <a:rPr lang="en-US" dirty="0"/>
               <a:pPr algn="r"/>
-              <a:t>9/15/2025</a:t>
+              <a:t>9/16/2025</a:t>
             </a:fld>
             <a:endParaRPr lang="en-US" dirty="0"/>
           </a:p>
@@ -14071,7 +14309,7 @@
             <a:fld id="{A37D6D71-8B28-4ED6-B932-04B197003D23}" type="datetimeFigureOut">
               <a:rPr lang="en-US" dirty="0"/>
               <a:pPr algn="r"/>
-              <a:t>9/15/2025</a:t>
+              <a:t>9/16/2025</a:t>
             </a:fld>
             <a:endParaRPr lang="en-US" dirty="0"/>
           </a:p>
@@ -14285,7 +14523,7 @@
             <a:fld id="{A37D6D71-8B28-4ED6-B932-04B197003D23}" type="datetimeFigureOut">
               <a:rPr lang="en-US" dirty="0"/>
               <a:pPr algn="r"/>
-              <a:t>9/15/2025</a:t>
+              <a:t>9/16/2025</a:t>
             </a:fld>
             <a:endParaRPr lang="en-US" dirty="0"/>
           </a:p>
@@ -14614,7 +14852,7 @@
             <a:fld id="{A37D6D71-8B28-4ED6-B932-04B197003D23}" type="datetimeFigureOut">
               <a:rPr lang="en-US" dirty="0"/>
               <a:pPr algn="r"/>
-              <a:t>9/15/2025</a:t>
+              <a:t>9/16/2025</a:t>
             </a:fld>
             <a:endParaRPr lang="en-US" dirty="0"/>
           </a:p>
@@ -14887,7 +15125,7 @@
             <a:fld id="{A37D6D71-8B28-4ED6-B932-04B197003D23}" type="datetimeFigureOut">
               <a:rPr lang="en-US" dirty="0"/>
               <a:pPr algn="r"/>
-              <a:t>9/15/2025</a:t>
+              <a:t>9/16/2025</a:t>
             </a:fld>
             <a:endParaRPr lang="en-US" dirty="0"/>
           </a:p>
@@ -15274,7 +15512,7 @@
             <a:fld id="{A37D6D71-8B28-4ED6-B932-04B197003D23}" type="datetimeFigureOut">
               <a:rPr lang="en-US" dirty="0"/>
               <a:pPr algn="r"/>
-              <a:t>9/15/2025</a:t>
+              <a:t>9/16/2025</a:t>
             </a:fld>
             <a:endParaRPr lang="en-US" dirty="0"/>
           </a:p>
@@ -15451,7 +15689,7 @@
             <a:fld id="{A37D6D71-8B28-4ED6-B932-04B197003D23}" type="datetimeFigureOut">
               <a:rPr lang="en-US" dirty="0"/>
               <a:pPr algn="r"/>
-              <a:t>9/15/2025</a:t>
+              <a:t>9/16/2025</a:t>
             </a:fld>
             <a:endParaRPr lang="en-US" dirty="0"/>
           </a:p>
@@ -15572,7 +15810,7 @@
             <a:fld id="{A37D6D71-8B28-4ED6-B932-04B197003D23}" type="datetimeFigureOut">
               <a:rPr lang="en-US" dirty="0"/>
               <a:pPr algn="r"/>
-              <a:t>9/15/2025</a:t>
+              <a:t>9/16/2025</a:t>
             </a:fld>
             <a:endParaRPr lang="en-US" dirty="0"/>
           </a:p>
@@ -15856,7 +16094,7 @@
             <a:fld id="{A37D6D71-8B28-4ED6-B932-04B197003D23}" type="datetimeFigureOut">
               <a:rPr lang="en-US" dirty="0"/>
               <a:pPr algn="r"/>
-              <a:t>9/15/2025</a:t>
+              <a:t>9/16/2025</a:t>
             </a:fld>
             <a:endParaRPr lang="en-US" dirty="0"/>
           </a:p>
@@ -16153,7 +16391,7 @@
             <a:fld id="{A37D6D71-8B28-4ED6-B932-04B197003D23}" type="datetimeFigureOut">
               <a:rPr lang="en-US" dirty="0"/>
               <a:pPr algn="r"/>
-              <a:t>9/15/2025</a:t>
+              <a:t>9/16/2025</a:t>
             </a:fld>
             <a:endParaRPr lang="en-US" dirty="0"/>
           </a:p>
@@ -16491,7 +16729,7 @@
             <a:fld id="{A37D6D71-8B28-4ED6-B932-04B197003D23}" type="datetimeFigureOut">
               <a:rPr lang="en-US" dirty="0"/>
               <a:pPr algn="r"/>
-              <a:t>9/15/2025</a:t>
+              <a:t>9/16/2025</a:t>
             </a:fld>
             <a:endParaRPr lang="en-US" spc="50" dirty="0"/>
           </a:p>
@@ -17169,14 +17407,14 @@
             <p:ph idx="1"/>
             <p:extLst>
               <p:ext uri="{D42A27DB-BD31-4B8C-83A1-F6EECF244321}">
-                <p14:modId xmlns:p14="http://schemas.microsoft.com/office/powerpoint/2010/main" val="2980228904"/>
+                <p14:modId xmlns:p14="http://schemas.microsoft.com/office/powerpoint/2010/main" val="3975279817"/>
               </p:ext>
             </p:extLst>
           </p:nvPr>
         </p:nvGraphicFramePr>
         <p:xfrm>
-          <a:off x="960120" y="2587752"/>
-          <a:ext cx="10268712" cy="3593592"/>
+          <a:off x="61828" y="2439070"/>
+          <a:ext cx="11916614" cy="4144957"/>
         </p:xfrm>
         <a:graphic>
           <a:graphicData uri="http://schemas.openxmlformats.org/drawingml/2006/diagram">
@@ -18136,13 +18374,13 @@
             <p:ph idx="1"/>
             <p:extLst>
               <p:ext uri="{D42A27DB-BD31-4B8C-83A1-F6EECF244321}">
-                <p14:modId xmlns:p14="http://schemas.microsoft.com/office/powerpoint/2010/main" val="2073863025"/>
+                <p14:modId xmlns:p14="http://schemas.microsoft.com/office/powerpoint/2010/main" val="435427960"/>
               </p:ext>
             </p:extLst>
           </p:nvPr>
         </p:nvGraphicFramePr>
         <p:xfrm>
-          <a:off x="960120" y="2587752"/>
+          <a:off x="2291070" y="1239384"/>
           <a:ext cx="10268712" cy="3593592"/>
         </p:xfrm>
         <a:graphic>
@@ -18205,13 +18443,13 @@
         </p:spPr>
         <p:txBody>
           <a:bodyPr anchor="ctr">
-            <a:normAutofit/>
+            <a:normAutofit fontScale="90000"/>
           </a:bodyPr>
           <a:lstStyle/>
           <a:p>
             <a:r>
               <a:rPr lang="en-US" dirty="0"/>
-              <a:t>Development Plan - Agile</a:t>
+              <a:t>Development Plan – Agile/Iterative</a:t>
             </a:r>
           </a:p>
         </p:txBody>

</xml_diff>